<commit_message>
verzia pred pridanim prednaskovych tem
</commit_message>
<xml_diff>
--- a/prezentácia/Využitie virtuálneho prostredia vo vzdelávaní Informačných technológií pomocou.pptx
+++ b/prezentácia/Využitie virtuálneho prostredia vo vzdelávaní Informačných technológií pomocou.pptx
@@ -113,6 +113,11 @@
       </a:defRPr>
     </a:lvl9pPr>
   </p:defaultTextStyle>
+  <p:extLst>
+    <p:ext uri="{EFAFB233-063F-42B5-8137-9DF3F51BA10A}">
+      <p15:sldGuideLst xmlns:p15="http://schemas.microsoft.com/office/powerpoint/2012/main"/>
+    </p:ext>
+  </p:extLst>
 </p:presentation>
 </file>
 
@@ -265,7 +270,7 @@
           <a:p>
             <a:fld id="{BE9F5E7E-86A4-4522-9B3A-A8AAEB68797A}" type="datetimeFigureOut">
               <a:rPr lang="cs-CZ" smtClean="0"/>
-              <a:t>19.11.2020</a:t>
+              <a:t>01.12.2020</a:t>
             </a:fld>
             <a:endParaRPr lang="cs-CZ"/>
           </a:p>
@@ -465,7 +470,7 @@
           <a:p>
             <a:fld id="{BE9F5E7E-86A4-4522-9B3A-A8AAEB68797A}" type="datetimeFigureOut">
               <a:rPr lang="cs-CZ" smtClean="0"/>
-              <a:t>19.11.2020</a:t>
+              <a:t>01.12.2020</a:t>
             </a:fld>
             <a:endParaRPr lang="cs-CZ"/>
           </a:p>
@@ -675,7 +680,7 @@
           <a:p>
             <a:fld id="{BE9F5E7E-86A4-4522-9B3A-A8AAEB68797A}" type="datetimeFigureOut">
               <a:rPr lang="cs-CZ" smtClean="0"/>
-              <a:t>19.11.2020</a:t>
+              <a:t>01.12.2020</a:t>
             </a:fld>
             <a:endParaRPr lang="cs-CZ"/>
           </a:p>
@@ -875,7 +880,7 @@
           <a:p>
             <a:fld id="{BE9F5E7E-86A4-4522-9B3A-A8AAEB68797A}" type="datetimeFigureOut">
               <a:rPr lang="cs-CZ" smtClean="0"/>
-              <a:t>19.11.2020</a:t>
+              <a:t>01.12.2020</a:t>
             </a:fld>
             <a:endParaRPr lang="cs-CZ"/>
           </a:p>
@@ -1151,7 +1156,7 @@
           <a:p>
             <a:fld id="{BE9F5E7E-86A4-4522-9B3A-A8AAEB68797A}" type="datetimeFigureOut">
               <a:rPr lang="cs-CZ" smtClean="0"/>
-              <a:t>19.11.2020</a:t>
+              <a:t>01.12.2020</a:t>
             </a:fld>
             <a:endParaRPr lang="cs-CZ"/>
           </a:p>
@@ -1419,7 +1424,7 @@
           <a:p>
             <a:fld id="{BE9F5E7E-86A4-4522-9B3A-A8AAEB68797A}" type="datetimeFigureOut">
               <a:rPr lang="cs-CZ" smtClean="0"/>
-              <a:t>19.11.2020</a:t>
+              <a:t>01.12.2020</a:t>
             </a:fld>
             <a:endParaRPr lang="cs-CZ"/>
           </a:p>
@@ -1834,7 +1839,7 @@
           <a:p>
             <a:fld id="{BE9F5E7E-86A4-4522-9B3A-A8AAEB68797A}" type="datetimeFigureOut">
               <a:rPr lang="cs-CZ" smtClean="0"/>
-              <a:t>19.11.2020</a:t>
+              <a:t>01.12.2020</a:t>
             </a:fld>
             <a:endParaRPr lang="cs-CZ"/>
           </a:p>
@@ -1976,7 +1981,7 @@
           <a:p>
             <a:fld id="{BE9F5E7E-86A4-4522-9B3A-A8AAEB68797A}" type="datetimeFigureOut">
               <a:rPr lang="cs-CZ" smtClean="0"/>
-              <a:t>19.11.2020</a:t>
+              <a:t>01.12.2020</a:t>
             </a:fld>
             <a:endParaRPr lang="cs-CZ"/>
           </a:p>
@@ -2089,7 +2094,7 @@
           <a:p>
             <a:fld id="{BE9F5E7E-86A4-4522-9B3A-A8AAEB68797A}" type="datetimeFigureOut">
               <a:rPr lang="cs-CZ" smtClean="0"/>
-              <a:t>19.11.2020</a:t>
+              <a:t>01.12.2020</a:t>
             </a:fld>
             <a:endParaRPr lang="cs-CZ"/>
           </a:p>
@@ -2402,7 +2407,7 @@
           <a:p>
             <a:fld id="{BE9F5E7E-86A4-4522-9B3A-A8AAEB68797A}" type="datetimeFigureOut">
               <a:rPr lang="cs-CZ" smtClean="0"/>
-              <a:t>19.11.2020</a:t>
+              <a:t>01.12.2020</a:t>
             </a:fld>
             <a:endParaRPr lang="cs-CZ"/>
           </a:p>
@@ -2691,7 +2696,7 @@
           <a:p>
             <a:fld id="{BE9F5E7E-86A4-4522-9B3A-A8AAEB68797A}" type="datetimeFigureOut">
               <a:rPr lang="cs-CZ" smtClean="0"/>
-              <a:t>19.11.2020</a:t>
+              <a:t>01.12.2020</a:t>
             </a:fld>
             <a:endParaRPr lang="cs-CZ"/>
           </a:p>
@@ -2934,7 +2939,7 @@
           <a:p>
             <a:fld id="{BE9F5E7E-86A4-4522-9B3A-A8AAEB68797A}" type="datetimeFigureOut">
               <a:rPr lang="cs-CZ" smtClean="0"/>
-              <a:t>19.11.2020</a:t>
+              <a:t>01.12.2020</a:t>
             </a:fld>
             <a:endParaRPr lang="cs-CZ"/>
           </a:p>
@@ -3968,7 +3973,7 @@
         <p:spPr/>
         <p:txBody>
           <a:bodyPr>
-            <a:normAutofit lnSpcReduction="10000"/>
+            <a:normAutofit fontScale="92500"/>
           </a:bodyPr>
           <a:lstStyle/>
           <a:p>
@@ -4009,6 +4014,15 @@
                 <a:hlinkClick r:id="rId2"/>
               </a:rPr>
               <a:t>http://leadvision.mx/feedback/the-psychological-triggers-of-feedback/</a:t>
+            </a:r>
+            <a:endParaRPr lang="cs-CZ" dirty="0"/>
+          </a:p>
+          <a:p>
+            <a:r>
+              <a:rPr lang="en-GB" dirty="0">
+                <a:hlinkClick r:id="rId3"/>
+              </a:rPr>
+              <a:t>https://acsieurope.org/cms/news_631</a:t>
             </a:r>
             <a:endParaRPr lang="en-GB" dirty="0"/>
           </a:p>
@@ -6007,12 +6021,12 @@
           <a:chExt cx="0" cy="0"/>
         </a:xfrm>
       </p:grpSpPr>
-      <p:sp>
+      <p:sp useBgFill="1">
         <p:nvSpPr>
-          <p:cNvPr id="8" name="Rectangle 7">
+          <p:cNvPr id="52" name="Rectangle 39">
             <a:extLst>
               <a:ext uri="{FF2B5EF4-FFF2-40B4-BE49-F238E27FC236}">
-                <a16:creationId xmlns:a16="http://schemas.microsoft.com/office/drawing/2014/main" id="{C54A3646-77FE-4862-96CE-45260829B18F}"/>
+                <a16:creationId xmlns:a16="http://schemas.microsoft.com/office/drawing/2014/main" id="{76EFD3D9-44F0-4267-BCC1-1613E79D8274}"/>
               </a:ext>
               <a:ext uri="{C183D7F6-B498-43B3-948B-1728B52AA6E4}">
                 <adec:decorative xmlns:adec="http://schemas.microsoft.com/office/drawing/2017/decorative" val="1"/>
@@ -6034,1529 +6048,6 @@
           <a:xfrm>
             <a:off x="0" y="0"/>
             <a:ext cx="12188952" cy="6858000"/>
-          </a:xfrm>
-          <a:prstGeom prst="rect">
-            <a:avLst/>
-          </a:prstGeom>
-          <a:solidFill>
-            <a:schemeClr val="accent1"/>
-          </a:solidFill>
-          <a:ln>
-            <a:noFill/>
-          </a:ln>
-        </p:spPr>
-        <p:style>
-          <a:lnRef idx="2">
-            <a:schemeClr val="accent1">
-              <a:shade val="50000"/>
-            </a:schemeClr>
-          </a:lnRef>
-          <a:fillRef idx="1">
-            <a:schemeClr val="accent1"/>
-          </a:fillRef>
-          <a:effectRef idx="0">
-            <a:schemeClr val="accent1"/>
-          </a:effectRef>
-          <a:fontRef idx="minor">
-            <a:schemeClr val="lt1"/>
-          </a:fontRef>
-        </p:style>
-        <p:txBody>
-          <a:bodyPr rtlCol="0" anchor="ctr"/>
-          <a:lstStyle/>
-          <a:p>
-            <a:pPr algn="ctr"/>
-            <a:endParaRPr lang="en-US"/>
-          </a:p>
-        </p:txBody>
-      </p:sp>
-      <p:grpSp>
-        <p:nvGrpSpPr>
-          <p:cNvPr id="10" name="Group 9">
-            <a:extLst>
-              <a:ext uri="{FF2B5EF4-FFF2-40B4-BE49-F238E27FC236}">
-                <a16:creationId xmlns:a16="http://schemas.microsoft.com/office/drawing/2014/main" id="{3F6FA249-9C10-48B9-9F72-1F333D8A9486}"/>
-              </a:ext>
-              <a:ext uri="{C183D7F6-B498-43B3-948B-1728B52AA6E4}">
-                <adec:decorative xmlns:adec="http://schemas.microsoft.com/office/drawing/2017/decorative" val="1"/>
-              </a:ext>
-            </a:extLst>
-          </p:cNvPr>
-          <p:cNvGrpSpPr>
-            <a:grpSpLocks noGrp="1" noUngrp="1" noRot="1" noChangeAspect="1" noMove="1" noResize="1"/>
-          </p:cNvGrpSpPr>
-          <p:nvPr>
-            <p:extLst>
-              <p:ext uri="{386F3935-93C4-4BCD-93E2-E3B085C9AB24}">
-                <p16:designElem xmlns:p16="http://schemas.microsoft.com/office/powerpoint/2015/main" val="1"/>
-              </p:ext>
-            </p:extLst>
-          </p:nvPr>
-        </p:nvGrpSpPr>
-        <p:grpSpPr>
-          <a:xfrm>
-            <a:off x="-417513" y="0"/>
-            <a:ext cx="12584114" cy="6853238"/>
-            <a:chOff x="-417513" y="0"/>
-            <a:chExt cx="12584114" cy="6853238"/>
-          </a:xfrm>
-        </p:grpSpPr>
-        <p:sp>
-          <p:nvSpPr>
-            <p:cNvPr id="11" name="Freeform 5">
-              <a:extLst>
-                <a:ext uri="{FF2B5EF4-FFF2-40B4-BE49-F238E27FC236}">
-                  <a16:creationId xmlns:a16="http://schemas.microsoft.com/office/drawing/2014/main" id="{036894FA-6F9A-4863-AEC5-B734F4226C26}"/>
-                </a:ext>
-                <a:ext uri="{C183D7F6-B498-43B3-948B-1728B52AA6E4}">
-                  <adec:decorative xmlns:adec="http://schemas.microsoft.com/office/drawing/2017/decorative" val="1"/>
-                </a:ext>
-              </a:extLst>
-            </p:cNvPr>
-            <p:cNvSpPr/>
-            <p:nvPr>
-              <p:extLst>
-                <p:ext uri="{386F3935-93C4-4BCD-93E2-E3B085C9AB24}">
-                  <p16:designElem xmlns:p16="http://schemas.microsoft.com/office/powerpoint/2015/main" val="1"/>
-                </p:ext>
-              </p:extLst>
-            </p:nvPr>
-          </p:nvSpPr>
-          <p:spPr bwMode="auto">
-            <a:xfrm>
-              <a:off x="1306513" y="0"/>
-              <a:ext cx="3862388" cy="6843713"/>
-            </a:xfrm>
-            <a:custGeom>
-              <a:avLst/>
-              <a:gdLst/>
-              <a:ahLst/>
-              <a:cxnLst/>
-              <a:rect l="0" t="0" r="r" b="b"/>
-              <a:pathLst>
-                <a:path w="813" h="1440">
-                  <a:moveTo>
-                    <a:pt x="813" y="0"/>
-                  </a:moveTo>
-                  <a:cubicBezTo>
-                    <a:pt x="331" y="221"/>
-                    <a:pt x="0" y="1039"/>
-                    <a:pt x="435" y="1440"/>
-                  </a:cubicBezTo>
-                </a:path>
-              </a:pathLst>
-            </a:custGeom>
-            <a:noFill/>
-            <a:ln w="9525" cap="flat">
-              <a:solidFill>
-                <a:schemeClr val="bg1">
-                  <a:alpha val="35000"/>
-                </a:schemeClr>
-              </a:solidFill>
-              <a:prstDash val="solid"/>
-              <a:miter lim="800000"/>
-              <a:headEnd/>
-              <a:tailEnd/>
-            </a:ln>
-            <a:extLst>
-              <a:ext uri="{909E8E84-426E-40DD-AFC4-6F175D3DCCD1}">
-                <a14:hiddenFill xmlns:a14="http://schemas.microsoft.com/office/drawing/2010/main">
-                  <a:solidFill>
-                    <a:srgbClr val="FFFFFF"/>
-                  </a:solidFill>
-                </a14:hiddenFill>
-              </a:ext>
-            </a:extLst>
-          </p:spPr>
-        </p:sp>
-        <p:sp>
-          <p:nvSpPr>
-            <p:cNvPr id="12" name="Freeform 6">
-              <a:extLst>
-                <a:ext uri="{FF2B5EF4-FFF2-40B4-BE49-F238E27FC236}">
-                  <a16:creationId xmlns:a16="http://schemas.microsoft.com/office/drawing/2014/main" id="{6B103C0B-E1BF-4BF0-9605-7426160F9EBD}"/>
-                </a:ext>
-                <a:ext uri="{C183D7F6-B498-43B3-948B-1728B52AA6E4}">
-                  <adec:decorative xmlns:adec="http://schemas.microsoft.com/office/drawing/2017/decorative" val="1"/>
-                </a:ext>
-              </a:extLst>
-            </p:cNvPr>
-            <p:cNvSpPr/>
-            <p:nvPr>
-              <p:extLst>
-                <p:ext uri="{386F3935-93C4-4BCD-93E2-E3B085C9AB24}">
-                  <p16:designElem xmlns:p16="http://schemas.microsoft.com/office/powerpoint/2015/main" val="1"/>
-                </p:ext>
-              </p:extLst>
-            </p:nvPr>
-          </p:nvSpPr>
-          <p:spPr bwMode="auto">
-            <a:xfrm>
-              <a:off x="10626725" y="9525"/>
-              <a:ext cx="1539875" cy="555625"/>
-            </a:xfrm>
-            <a:custGeom>
-              <a:avLst/>
-              <a:gdLst/>
-              <a:ahLst/>
-              <a:cxnLst/>
-              <a:rect l="0" t="0" r="r" b="b"/>
-              <a:pathLst>
-                <a:path w="324" h="117">
-                  <a:moveTo>
-                    <a:pt x="324" y="117"/>
-                  </a:moveTo>
-                  <a:cubicBezTo>
-                    <a:pt x="223" y="64"/>
-                    <a:pt x="107" y="28"/>
-                    <a:pt x="0" y="0"/>
-                  </a:cubicBezTo>
-                </a:path>
-              </a:pathLst>
-            </a:custGeom>
-            <a:noFill/>
-            <a:ln w="9525" cap="flat">
-              <a:solidFill>
-                <a:schemeClr val="bg1">
-                  <a:alpha val="35000"/>
-                </a:schemeClr>
-              </a:solidFill>
-              <a:prstDash val="solid"/>
-              <a:miter lim="800000"/>
-              <a:headEnd/>
-              <a:tailEnd/>
-            </a:ln>
-            <a:extLst>
-              <a:ext uri="{909E8E84-426E-40DD-AFC4-6F175D3DCCD1}">
-                <a14:hiddenFill xmlns:a14="http://schemas.microsoft.com/office/drawing/2010/main">
-                  <a:solidFill>
-                    <a:srgbClr val="FFFFFF"/>
-                  </a:solidFill>
-                </a14:hiddenFill>
-              </a:ext>
-            </a:extLst>
-          </p:spPr>
-        </p:sp>
-        <p:sp>
-          <p:nvSpPr>
-            <p:cNvPr id="13" name="Freeform 7">
-              <a:extLst>
-                <a:ext uri="{FF2B5EF4-FFF2-40B4-BE49-F238E27FC236}">
-                  <a16:creationId xmlns:a16="http://schemas.microsoft.com/office/drawing/2014/main" id="{B796B9AB-146B-42B0-B1F4-7EF69C521A09}"/>
-                </a:ext>
-                <a:ext uri="{C183D7F6-B498-43B3-948B-1728B52AA6E4}">
-                  <adec:decorative xmlns:adec="http://schemas.microsoft.com/office/drawing/2017/decorative" val="1"/>
-                </a:ext>
-              </a:extLst>
-            </p:cNvPr>
-            <p:cNvSpPr/>
-            <p:nvPr>
-              <p:extLst>
-                <p:ext uri="{386F3935-93C4-4BCD-93E2-E3B085C9AB24}">
-                  <p16:designElem xmlns:p16="http://schemas.microsoft.com/office/powerpoint/2015/main" val="1"/>
-                </p:ext>
-              </p:extLst>
-            </p:nvPr>
-          </p:nvSpPr>
-          <p:spPr bwMode="auto">
-            <a:xfrm>
-              <a:off x="10247313" y="5013325"/>
-              <a:ext cx="1919288" cy="1830388"/>
-            </a:xfrm>
-            <a:custGeom>
-              <a:avLst/>
-              <a:gdLst/>
-              <a:ahLst/>
-              <a:cxnLst/>
-              <a:rect l="0" t="0" r="r" b="b"/>
-              <a:pathLst>
-                <a:path w="404" h="385">
-                  <a:moveTo>
-                    <a:pt x="0" y="385"/>
-                  </a:moveTo>
-                  <a:cubicBezTo>
-                    <a:pt x="146" y="272"/>
-                    <a:pt x="285" y="142"/>
-                    <a:pt x="404" y="0"/>
-                  </a:cubicBezTo>
-                </a:path>
-              </a:pathLst>
-            </a:custGeom>
-            <a:noFill/>
-            <a:ln w="9525" cap="flat">
-              <a:solidFill>
-                <a:schemeClr val="bg1">
-                  <a:alpha val="35000"/>
-                </a:schemeClr>
-              </a:solidFill>
-              <a:prstDash val="solid"/>
-              <a:miter lim="800000"/>
-              <a:headEnd/>
-              <a:tailEnd/>
-            </a:ln>
-            <a:extLst>
-              <a:ext uri="{909E8E84-426E-40DD-AFC4-6F175D3DCCD1}">
-                <a14:hiddenFill xmlns:a14="http://schemas.microsoft.com/office/drawing/2010/main">
-                  <a:solidFill>
-                    <a:srgbClr val="FFFFFF"/>
-                  </a:solidFill>
-                </a14:hiddenFill>
-              </a:ext>
-            </a:extLst>
-          </p:spPr>
-        </p:sp>
-        <p:sp>
-          <p:nvSpPr>
-            <p:cNvPr id="14" name="Freeform 8">
-              <a:extLst>
-                <a:ext uri="{FF2B5EF4-FFF2-40B4-BE49-F238E27FC236}">
-                  <a16:creationId xmlns:a16="http://schemas.microsoft.com/office/drawing/2014/main" id="{0B8CEE20-F67A-4CFC-88F1-4C942EB624F9}"/>
-                </a:ext>
-                <a:ext uri="{C183D7F6-B498-43B3-948B-1728B52AA6E4}">
-                  <adec:decorative xmlns:adec="http://schemas.microsoft.com/office/drawing/2017/decorative" val="1"/>
-                </a:ext>
-              </a:extLst>
-            </p:cNvPr>
-            <p:cNvSpPr/>
-            <p:nvPr>
-              <p:extLst>
-                <p:ext uri="{386F3935-93C4-4BCD-93E2-E3B085C9AB24}">
-                  <p16:designElem xmlns:p16="http://schemas.microsoft.com/office/powerpoint/2015/main" val="1"/>
-                </p:ext>
-              </p:extLst>
-            </p:nvPr>
-          </p:nvSpPr>
-          <p:spPr bwMode="auto">
-            <a:xfrm>
-              <a:off x="1120775" y="0"/>
-              <a:ext cx="3676650" cy="6843713"/>
-            </a:xfrm>
-            <a:custGeom>
-              <a:avLst/>
-              <a:gdLst/>
-              <a:ahLst/>
-              <a:cxnLst/>
-              <a:rect l="0" t="0" r="r" b="b"/>
-              <a:pathLst>
-                <a:path w="774" h="1440">
-                  <a:moveTo>
-                    <a:pt x="774" y="0"/>
-                  </a:moveTo>
-                  <a:cubicBezTo>
-                    <a:pt x="312" y="240"/>
-                    <a:pt x="0" y="1034"/>
-                    <a:pt x="411" y="1440"/>
-                  </a:cubicBezTo>
-                </a:path>
-              </a:pathLst>
-            </a:custGeom>
-            <a:noFill/>
-            <a:ln w="9525" cap="flat">
-              <a:solidFill>
-                <a:schemeClr val="bg1">
-                  <a:alpha val="35000"/>
-                </a:schemeClr>
-              </a:solidFill>
-              <a:prstDash val="dash"/>
-              <a:miter lim="800000"/>
-              <a:headEnd/>
-              <a:tailEnd/>
-            </a:ln>
-            <a:extLst>
-              <a:ext uri="{909E8E84-426E-40DD-AFC4-6F175D3DCCD1}">
-                <a14:hiddenFill xmlns:a14="http://schemas.microsoft.com/office/drawing/2010/main">
-                  <a:solidFill>
-                    <a:srgbClr val="FFFFFF"/>
-                  </a:solidFill>
-                </a14:hiddenFill>
-              </a:ext>
-            </a:extLst>
-          </p:spPr>
-        </p:sp>
-        <p:sp>
-          <p:nvSpPr>
-            <p:cNvPr id="15" name="Freeform 9">
-              <a:extLst>
-                <a:ext uri="{FF2B5EF4-FFF2-40B4-BE49-F238E27FC236}">
-                  <a16:creationId xmlns:a16="http://schemas.microsoft.com/office/drawing/2014/main" id="{6B823E68-E880-4A79-82AD-6088E1DEADAF}"/>
-                </a:ext>
-                <a:ext uri="{C183D7F6-B498-43B3-948B-1728B52AA6E4}">
-                  <adec:decorative xmlns:adec="http://schemas.microsoft.com/office/drawing/2017/decorative" val="1"/>
-                </a:ext>
-              </a:extLst>
-            </p:cNvPr>
-            <p:cNvSpPr/>
-            <p:nvPr>
-              <p:extLst>
-                <p:ext uri="{386F3935-93C4-4BCD-93E2-E3B085C9AB24}">
-                  <p16:designElem xmlns:p16="http://schemas.microsoft.com/office/powerpoint/2015/main" val="1"/>
-                </p:ext>
-              </p:extLst>
-            </p:nvPr>
-          </p:nvSpPr>
-          <p:spPr bwMode="auto">
-            <a:xfrm>
-              <a:off x="11202988" y="9525"/>
-              <a:ext cx="963613" cy="366713"/>
-            </a:xfrm>
-            <a:custGeom>
-              <a:avLst/>
-              <a:gdLst/>
-              <a:ahLst/>
-              <a:cxnLst/>
-              <a:rect l="0" t="0" r="r" b="b"/>
-              <a:pathLst>
-                <a:path w="203" h="77">
-                  <a:moveTo>
-                    <a:pt x="203" y="77"/>
-                  </a:moveTo>
-                  <a:cubicBezTo>
-                    <a:pt x="138" y="46"/>
-                    <a:pt x="68" y="21"/>
-                    <a:pt x="0" y="0"/>
-                  </a:cubicBezTo>
-                </a:path>
-              </a:pathLst>
-            </a:custGeom>
-            <a:noFill/>
-            <a:ln w="9525" cap="flat">
-              <a:solidFill>
-                <a:schemeClr val="bg1">
-                  <a:alpha val="35000"/>
-                </a:schemeClr>
-              </a:solidFill>
-              <a:prstDash val="dash"/>
-              <a:miter lim="800000"/>
-              <a:headEnd/>
-              <a:tailEnd/>
-            </a:ln>
-            <a:extLst>
-              <a:ext uri="{909E8E84-426E-40DD-AFC4-6F175D3DCCD1}">
-                <a14:hiddenFill xmlns:a14="http://schemas.microsoft.com/office/drawing/2010/main">
-                  <a:solidFill>
-                    <a:srgbClr val="FFFFFF"/>
-                  </a:solidFill>
-                </a14:hiddenFill>
-              </a:ext>
-            </a:extLst>
-          </p:spPr>
-        </p:sp>
-        <p:sp>
-          <p:nvSpPr>
-            <p:cNvPr id="16" name="Freeform 10">
-              <a:extLst>
-                <a:ext uri="{FF2B5EF4-FFF2-40B4-BE49-F238E27FC236}">
-                  <a16:creationId xmlns:a16="http://schemas.microsoft.com/office/drawing/2014/main" id="{C90FFE78-151B-4C6F-893F-6832706022F6}"/>
-                </a:ext>
-                <a:ext uri="{C183D7F6-B498-43B3-948B-1728B52AA6E4}">
-                  <adec:decorative xmlns:adec="http://schemas.microsoft.com/office/drawing/2017/decorative" val="1"/>
-                </a:ext>
-              </a:extLst>
-            </p:cNvPr>
-            <p:cNvSpPr/>
-            <p:nvPr>
-              <p:extLst>
-                <p:ext uri="{386F3935-93C4-4BCD-93E2-E3B085C9AB24}">
-                  <p16:designElem xmlns:p16="http://schemas.microsoft.com/office/powerpoint/2015/main" val="1"/>
-                </p:ext>
-              </p:extLst>
-            </p:nvPr>
-          </p:nvSpPr>
-          <p:spPr bwMode="auto">
-            <a:xfrm>
-              <a:off x="10494963" y="5275263"/>
-              <a:ext cx="1666875" cy="1577975"/>
-            </a:xfrm>
-            <a:custGeom>
-              <a:avLst/>
-              <a:gdLst/>
-              <a:ahLst/>
-              <a:cxnLst/>
-              <a:rect l="0" t="0" r="r" b="b"/>
-              <a:pathLst>
-                <a:path w="351" h="332">
-                  <a:moveTo>
-                    <a:pt x="0" y="332"/>
-                  </a:moveTo>
-                  <a:cubicBezTo>
-                    <a:pt x="125" y="232"/>
-                    <a:pt x="245" y="121"/>
-                    <a:pt x="351" y="0"/>
-                  </a:cubicBezTo>
-                </a:path>
-              </a:pathLst>
-            </a:custGeom>
-            <a:noFill/>
-            <a:ln w="9525" cap="flat">
-              <a:solidFill>
-                <a:schemeClr val="bg1">
-                  <a:alpha val="35000"/>
-                </a:schemeClr>
-              </a:solidFill>
-              <a:prstDash val="dash"/>
-              <a:miter lim="800000"/>
-              <a:headEnd/>
-              <a:tailEnd/>
-            </a:ln>
-            <a:extLst>
-              <a:ext uri="{909E8E84-426E-40DD-AFC4-6F175D3DCCD1}">
-                <a14:hiddenFill xmlns:a14="http://schemas.microsoft.com/office/drawing/2010/main">
-                  <a:solidFill>
-                    <a:srgbClr val="FFFFFF"/>
-                  </a:solidFill>
-                </a14:hiddenFill>
-              </a:ext>
-            </a:extLst>
-          </p:spPr>
-        </p:sp>
-        <p:sp>
-          <p:nvSpPr>
-            <p:cNvPr id="17" name="Freeform 11">
-              <a:extLst>
-                <a:ext uri="{FF2B5EF4-FFF2-40B4-BE49-F238E27FC236}">
-                  <a16:creationId xmlns:a16="http://schemas.microsoft.com/office/drawing/2014/main" id="{3A2B9B53-0432-42A0-ACC1-23CCDB1183AF}"/>
-                </a:ext>
-                <a:ext uri="{C183D7F6-B498-43B3-948B-1728B52AA6E4}">
-                  <adec:decorative xmlns:adec="http://schemas.microsoft.com/office/drawing/2017/decorative" val="1"/>
-                </a:ext>
-              </a:extLst>
-            </p:cNvPr>
-            <p:cNvSpPr/>
-            <p:nvPr>
-              <p:extLst>
-                <p:ext uri="{386F3935-93C4-4BCD-93E2-E3B085C9AB24}">
-                  <p16:designElem xmlns:p16="http://schemas.microsoft.com/office/powerpoint/2015/main" val="1"/>
-                </p:ext>
-              </p:extLst>
-            </p:nvPr>
-          </p:nvSpPr>
-          <p:spPr bwMode="auto">
-            <a:xfrm>
-              <a:off x="1001713" y="0"/>
-              <a:ext cx="3621088" cy="6843713"/>
-            </a:xfrm>
-            <a:custGeom>
-              <a:avLst/>
-              <a:gdLst/>
-              <a:ahLst/>
-              <a:cxnLst/>
-              <a:rect l="0" t="0" r="r" b="b"/>
-              <a:pathLst>
-                <a:path w="762" h="1440">
-                  <a:moveTo>
-                    <a:pt x="762" y="0"/>
-                  </a:moveTo>
-                  <a:cubicBezTo>
-                    <a:pt x="308" y="245"/>
-                    <a:pt x="0" y="1033"/>
-                    <a:pt x="403" y="1440"/>
-                  </a:cubicBezTo>
-                </a:path>
-              </a:pathLst>
-            </a:custGeom>
-            <a:noFill/>
-            <a:ln w="9525" cap="flat">
-              <a:solidFill>
-                <a:schemeClr val="bg1">
-                  <a:alpha val="35000"/>
-                </a:schemeClr>
-              </a:solidFill>
-              <a:prstDash val="solid"/>
-              <a:miter lim="800000"/>
-              <a:headEnd/>
-              <a:tailEnd/>
-            </a:ln>
-            <a:extLst>
-              <a:ext uri="{909E8E84-426E-40DD-AFC4-6F175D3DCCD1}">
-                <a14:hiddenFill xmlns:a14="http://schemas.microsoft.com/office/drawing/2010/main">
-                  <a:solidFill>
-                    <a:srgbClr val="FFFFFF"/>
-                  </a:solidFill>
-                </a14:hiddenFill>
-              </a:ext>
-            </a:extLst>
-          </p:spPr>
-        </p:sp>
-        <p:sp>
-          <p:nvSpPr>
-            <p:cNvPr id="18" name="Freeform 12">
-              <a:extLst>
-                <a:ext uri="{FF2B5EF4-FFF2-40B4-BE49-F238E27FC236}">
-                  <a16:creationId xmlns:a16="http://schemas.microsoft.com/office/drawing/2014/main" id="{142954D5-E17A-4C4B-B575-9D2BE72C64AE}"/>
-                </a:ext>
-                <a:ext uri="{C183D7F6-B498-43B3-948B-1728B52AA6E4}">
-                  <adec:decorative xmlns:adec="http://schemas.microsoft.com/office/drawing/2017/decorative" val="1"/>
-                </a:ext>
-              </a:extLst>
-            </p:cNvPr>
-            <p:cNvSpPr/>
-            <p:nvPr>
-              <p:extLst>
-                <p:ext uri="{386F3935-93C4-4BCD-93E2-E3B085C9AB24}">
-                  <p16:designElem xmlns:p16="http://schemas.microsoft.com/office/powerpoint/2015/main" val="1"/>
-                </p:ext>
-              </p:extLst>
-            </p:nvPr>
-          </p:nvSpPr>
-          <p:spPr bwMode="auto">
-            <a:xfrm>
-              <a:off x="11501438" y="9525"/>
-              <a:ext cx="665163" cy="257175"/>
-            </a:xfrm>
-            <a:custGeom>
-              <a:avLst/>
-              <a:gdLst/>
-              <a:ahLst/>
-              <a:cxnLst/>
-              <a:rect l="0" t="0" r="r" b="b"/>
-              <a:pathLst>
-                <a:path w="140" h="54">
-                  <a:moveTo>
-                    <a:pt x="140" y="54"/>
-                  </a:moveTo>
-                  <a:cubicBezTo>
-                    <a:pt x="95" y="34"/>
-                    <a:pt x="48" y="16"/>
-                    <a:pt x="0" y="0"/>
-                  </a:cubicBezTo>
-                </a:path>
-              </a:pathLst>
-            </a:custGeom>
-            <a:noFill/>
-            <a:ln w="9525" cap="flat">
-              <a:solidFill>
-                <a:schemeClr val="bg1">
-                  <a:alpha val="35000"/>
-                </a:schemeClr>
-              </a:solidFill>
-              <a:prstDash val="solid"/>
-              <a:miter lim="800000"/>
-              <a:headEnd/>
-              <a:tailEnd/>
-            </a:ln>
-            <a:extLst>
-              <a:ext uri="{909E8E84-426E-40DD-AFC4-6F175D3DCCD1}">
-                <a14:hiddenFill xmlns:a14="http://schemas.microsoft.com/office/drawing/2010/main">
-                  <a:solidFill>
-                    <a:srgbClr val="FFFFFF"/>
-                  </a:solidFill>
-                </a14:hiddenFill>
-              </a:ext>
-            </a:extLst>
-          </p:spPr>
-        </p:sp>
-        <p:sp>
-          <p:nvSpPr>
-            <p:cNvPr id="19" name="Freeform 13">
-              <a:extLst>
-                <a:ext uri="{FF2B5EF4-FFF2-40B4-BE49-F238E27FC236}">
-                  <a16:creationId xmlns:a16="http://schemas.microsoft.com/office/drawing/2014/main" id="{2317E4B1-5573-4066-895C-2FB759804A2C}"/>
-                </a:ext>
-                <a:ext uri="{C183D7F6-B498-43B3-948B-1728B52AA6E4}">
-                  <adec:decorative xmlns:adec="http://schemas.microsoft.com/office/drawing/2017/decorative" val="1"/>
-                </a:ext>
-              </a:extLst>
-            </p:cNvPr>
-            <p:cNvSpPr/>
-            <p:nvPr>
-              <p:extLst>
-                <p:ext uri="{386F3935-93C4-4BCD-93E2-E3B085C9AB24}">
-                  <p16:designElem xmlns:p16="http://schemas.microsoft.com/office/powerpoint/2015/main" val="1"/>
-                </p:ext>
-              </p:extLst>
-            </p:nvPr>
-          </p:nvSpPr>
-          <p:spPr bwMode="auto">
-            <a:xfrm>
-              <a:off x="10641013" y="5408613"/>
-              <a:ext cx="1525588" cy="1435100"/>
-            </a:xfrm>
-            <a:custGeom>
-              <a:avLst/>
-              <a:gdLst/>
-              <a:ahLst/>
-              <a:cxnLst/>
-              <a:rect l="0" t="0" r="r" b="b"/>
-              <a:pathLst>
-                <a:path w="321" h="302">
-                  <a:moveTo>
-                    <a:pt x="0" y="302"/>
-                  </a:moveTo>
-                  <a:cubicBezTo>
-                    <a:pt x="114" y="210"/>
-                    <a:pt x="223" y="109"/>
-                    <a:pt x="321" y="0"/>
-                  </a:cubicBezTo>
-                </a:path>
-              </a:pathLst>
-            </a:custGeom>
-            <a:noFill/>
-            <a:ln w="9525" cap="flat">
-              <a:solidFill>
-                <a:schemeClr val="bg1">
-                  <a:alpha val="35000"/>
-                </a:schemeClr>
-              </a:solidFill>
-              <a:prstDash val="solid"/>
-              <a:miter lim="800000"/>
-              <a:headEnd/>
-              <a:tailEnd/>
-            </a:ln>
-            <a:extLst>
-              <a:ext uri="{909E8E84-426E-40DD-AFC4-6F175D3DCCD1}">
-                <a14:hiddenFill xmlns:a14="http://schemas.microsoft.com/office/drawing/2010/main">
-                  <a:solidFill>
-                    <a:srgbClr val="FFFFFF"/>
-                  </a:solidFill>
-                </a14:hiddenFill>
-              </a:ext>
-            </a:extLst>
-          </p:spPr>
-        </p:sp>
-        <p:sp>
-          <p:nvSpPr>
-            <p:cNvPr id="20" name="Freeform 14">
-              <a:extLst>
-                <a:ext uri="{FF2B5EF4-FFF2-40B4-BE49-F238E27FC236}">
-                  <a16:creationId xmlns:a16="http://schemas.microsoft.com/office/drawing/2014/main" id="{EBA723B4-613D-41FA-93E8-94173C930FF0}"/>
-                </a:ext>
-                <a:ext uri="{C183D7F6-B498-43B3-948B-1728B52AA6E4}">
-                  <adec:decorative xmlns:adec="http://schemas.microsoft.com/office/drawing/2017/decorative" val="1"/>
-                </a:ext>
-              </a:extLst>
-            </p:cNvPr>
-            <p:cNvSpPr/>
-            <p:nvPr>
-              <p:extLst>
-                <p:ext uri="{386F3935-93C4-4BCD-93E2-E3B085C9AB24}">
-                  <p16:designElem xmlns:p16="http://schemas.microsoft.com/office/powerpoint/2015/main" val="1"/>
-                </p:ext>
-              </p:extLst>
-            </p:nvPr>
-          </p:nvSpPr>
-          <p:spPr bwMode="auto">
-            <a:xfrm>
-              <a:off x="1001713" y="0"/>
-              <a:ext cx="3244850" cy="6843713"/>
-            </a:xfrm>
-            <a:custGeom>
-              <a:avLst/>
-              <a:gdLst/>
-              <a:ahLst/>
-              <a:cxnLst/>
-              <a:rect l="0" t="0" r="r" b="b"/>
-              <a:pathLst>
-                <a:path w="683" h="1440">
-                  <a:moveTo>
-                    <a:pt x="683" y="0"/>
-                  </a:moveTo>
-                  <a:cubicBezTo>
-                    <a:pt x="258" y="256"/>
-                    <a:pt x="0" y="1041"/>
-                    <a:pt x="355" y="1440"/>
-                  </a:cubicBezTo>
-                </a:path>
-              </a:pathLst>
-            </a:custGeom>
-            <a:noFill/>
-            <a:ln w="9525" cap="flat">
-              <a:solidFill>
-                <a:schemeClr val="bg1">
-                  <a:alpha val="35000"/>
-                </a:schemeClr>
-              </a:solidFill>
-              <a:prstDash val="solid"/>
-              <a:miter lim="800000"/>
-              <a:headEnd/>
-              <a:tailEnd/>
-            </a:ln>
-            <a:extLst>
-              <a:ext uri="{909E8E84-426E-40DD-AFC4-6F175D3DCCD1}">
-                <a14:hiddenFill xmlns:a14="http://schemas.microsoft.com/office/drawing/2010/main">
-                  <a:solidFill>
-                    <a:srgbClr val="FFFFFF"/>
-                  </a:solidFill>
-                </a14:hiddenFill>
-              </a:ext>
-            </a:extLst>
-          </p:spPr>
-        </p:sp>
-        <p:sp>
-          <p:nvSpPr>
-            <p:cNvPr id="21" name="Freeform 15">
-              <a:extLst>
-                <a:ext uri="{FF2B5EF4-FFF2-40B4-BE49-F238E27FC236}">
-                  <a16:creationId xmlns:a16="http://schemas.microsoft.com/office/drawing/2014/main" id="{D2693AEC-A60D-40B1-87B3-1EF30A56D4BD}"/>
-                </a:ext>
-                <a:ext uri="{C183D7F6-B498-43B3-948B-1728B52AA6E4}">
-                  <adec:decorative xmlns:adec="http://schemas.microsoft.com/office/drawing/2017/decorative" val="1"/>
-                </a:ext>
-              </a:extLst>
-            </p:cNvPr>
-            <p:cNvSpPr/>
-            <p:nvPr>
-              <p:extLst>
-                <p:ext uri="{386F3935-93C4-4BCD-93E2-E3B085C9AB24}">
-                  <p16:designElem xmlns:p16="http://schemas.microsoft.com/office/powerpoint/2015/main" val="1"/>
-                </p:ext>
-              </p:extLst>
-            </p:nvPr>
-          </p:nvSpPr>
-          <p:spPr bwMode="auto">
-            <a:xfrm>
-              <a:off x="10802938" y="5518150"/>
-              <a:ext cx="1363663" cy="1325563"/>
-            </a:xfrm>
-            <a:custGeom>
-              <a:avLst/>
-              <a:gdLst/>
-              <a:ahLst/>
-              <a:cxnLst/>
-              <a:rect l="0" t="0" r="r" b="b"/>
-              <a:pathLst>
-                <a:path w="287" h="279">
-                  <a:moveTo>
-                    <a:pt x="0" y="279"/>
-                  </a:moveTo>
-                  <a:cubicBezTo>
-                    <a:pt x="101" y="193"/>
-                    <a:pt x="198" y="100"/>
-                    <a:pt x="287" y="0"/>
-                  </a:cubicBezTo>
-                </a:path>
-              </a:pathLst>
-            </a:custGeom>
-            <a:noFill/>
-            <a:ln w="9525" cap="flat">
-              <a:solidFill>
-                <a:schemeClr val="bg1">
-                  <a:alpha val="35000"/>
-                </a:schemeClr>
-              </a:solidFill>
-              <a:prstDash val="solid"/>
-              <a:miter lim="800000"/>
-              <a:headEnd/>
-              <a:tailEnd/>
-            </a:ln>
-            <a:extLst>
-              <a:ext uri="{909E8E84-426E-40DD-AFC4-6F175D3DCCD1}">
-                <a14:hiddenFill xmlns:a14="http://schemas.microsoft.com/office/drawing/2010/main">
-                  <a:solidFill>
-                    <a:srgbClr val="FFFFFF"/>
-                  </a:solidFill>
-                </a14:hiddenFill>
-              </a:ext>
-            </a:extLst>
-          </p:spPr>
-        </p:sp>
-        <p:sp>
-          <p:nvSpPr>
-            <p:cNvPr id="22" name="Freeform 16">
-              <a:extLst>
-                <a:ext uri="{FF2B5EF4-FFF2-40B4-BE49-F238E27FC236}">
-                  <a16:creationId xmlns:a16="http://schemas.microsoft.com/office/drawing/2014/main" id="{0EFB57B1-129C-4CA5-9513-29226043BF35}"/>
-                </a:ext>
-                <a:ext uri="{C183D7F6-B498-43B3-948B-1728B52AA6E4}">
-                  <adec:decorative xmlns:adec="http://schemas.microsoft.com/office/drawing/2017/decorative" val="1"/>
-                </a:ext>
-              </a:extLst>
-            </p:cNvPr>
-            <p:cNvSpPr/>
-            <p:nvPr>
-              <p:extLst>
-                <p:ext uri="{386F3935-93C4-4BCD-93E2-E3B085C9AB24}">
-                  <p16:designElem xmlns:p16="http://schemas.microsoft.com/office/powerpoint/2015/main" val="1"/>
-                </p:ext>
-              </p:extLst>
-            </p:nvPr>
-          </p:nvSpPr>
-          <p:spPr bwMode="auto">
-            <a:xfrm>
-              <a:off x="889000" y="0"/>
-              <a:ext cx="3230563" cy="6843713"/>
-            </a:xfrm>
-            <a:custGeom>
-              <a:avLst/>
-              <a:gdLst/>
-              <a:ahLst/>
-              <a:cxnLst/>
-              <a:rect l="0" t="0" r="r" b="b"/>
-              <a:pathLst>
-                <a:path w="680" h="1440">
-                  <a:moveTo>
-                    <a:pt x="680" y="0"/>
-                  </a:moveTo>
-                  <a:cubicBezTo>
-                    <a:pt x="257" y="265"/>
-                    <a:pt x="0" y="1026"/>
-                    <a:pt x="337" y="1440"/>
-                  </a:cubicBezTo>
-                </a:path>
-              </a:pathLst>
-            </a:custGeom>
-            <a:noFill/>
-            <a:ln w="9525" cap="flat">
-              <a:solidFill>
-                <a:schemeClr val="bg1">
-                  <a:alpha val="35000"/>
-                </a:schemeClr>
-              </a:solidFill>
-              <a:prstDash val="solid"/>
-              <a:miter lim="800000"/>
-              <a:headEnd/>
-              <a:tailEnd/>
-            </a:ln>
-            <a:extLst>
-              <a:ext uri="{909E8E84-426E-40DD-AFC4-6F175D3DCCD1}">
-                <a14:hiddenFill xmlns:a14="http://schemas.microsoft.com/office/drawing/2010/main">
-                  <a:solidFill>
-                    <a:srgbClr val="FFFFFF"/>
-                  </a:solidFill>
-                </a14:hiddenFill>
-              </a:ext>
-            </a:extLst>
-          </p:spPr>
-        </p:sp>
-        <p:sp>
-          <p:nvSpPr>
-            <p:cNvPr id="23" name="Freeform 17">
-              <a:extLst>
-                <a:ext uri="{FF2B5EF4-FFF2-40B4-BE49-F238E27FC236}">
-                  <a16:creationId xmlns:a16="http://schemas.microsoft.com/office/drawing/2014/main" id="{AC89A1FD-35E1-4574-A439-61C20F457D30}"/>
-                </a:ext>
-                <a:ext uri="{C183D7F6-B498-43B3-948B-1728B52AA6E4}">
-                  <adec:decorative xmlns:adec="http://schemas.microsoft.com/office/drawing/2017/decorative" val="1"/>
-                </a:ext>
-              </a:extLst>
-            </p:cNvPr>
-            <p:cNvSpPr/>
-            <p:nvPr>
-              <p:extLst>
-                <p:ext uri="{386F3935-93C4-4BCD-93E2-E3B085C9AB24}">
-                  <p16:designElem xmlns:p16="http://schemas.microsoft.com/office/powerpoint/2015/main" val="1"/>
-                </p:ext>
-              </p:extLst>
-            </p:nvPr>
-          </p:nvSpPr>
-          <p:spPr bwMode="auto">
-            <a:xfrm>
-              <a:off x="10979150" y="5694363"/>
-              <a:ext cx="1187450" cy="1149350"/>
-            </a:xfrm>
-            <a:custGeom>
-              <a:avLst/>
-              <a:gdLst/>
-              <a:ahLst/>
-              <a:cxnLst/>
-              <a:rect l="0" t="0" r="r" b="b"/>
-              <a:pathLst>
-                <a:path w="250" h="242">
-                  <a:moveTo>
-                    <a:pt x="0" y="242"/>
-                  </a:moveTo>
-                  <a:cubicBezTo>
-                    <a:pt x="88" y="166"/>
-                    <a:pt x="172" y="85"/>
-                    <a:pt x="250" y="0"/>
-                  </a:cubicBezTo>
-                </a:path>
-              </a:pathLst>
-            </a:custGeom>
-            <a:noFill/>
-            <a:ln w="9525" cap="flat">
-              <a:solidFill>
-                <a:schemeClr val="bg1">
-                  <a:alpha val="35000"/>
-                </a:schemeClr>
-              </a:solidFill>
-              <a:prstDash val="solid"/>
-              <a:miter lim="800000"/>
-              <a:headEnd/>
-              <a:tailEnd/>
-            </a:ln>
-            <a:extLst>
-              <a:ext uri="{909E8E84-426E-40DD-AFC4-6F175D3DCCD1}">
-                <a14:hiddenFill xmlns:a14="http://schemas.microsoft.com/office/drawing/2010/main">
-                  <a:solidFill>
-                    <a:srgbClr val="FFFFFF"/>
-                  </a:solidFill>
-                </a14:hiddenFill>
-              </a:ext>
-            </a:extLst>
-          </p:spPr>
-        </p:sp>
-        <p:sp>
-          <p:nvSpPr>
-            <p:cNvPr id="24" name="Freeform 18">
-              <a:extLst>
-                <a:ext uri="{FF2B5EF4-FFF2-40B4-BE49-F238E27FC236}">
-                  <a16:creationId xmlns:a16="http://schemas.microsoft.com/office/drawing/2014/main" id="{4D55D1DF-59D8-4B47-87C4-FB3A82689AE6}"/>
-                </a:ext>
-                <a:ext uri="{C183D7F6-B498-43B3-948B-1728B52AA6E4}">
-                  <adec:decorative xmlns:adec="http://schemas.microsoft.com/office/drawing/2017/decorative" val="1"/>
-                </a:ext>
-              </a:extLst>
-            </p:cNvPr>
-            <p:cNvSpPr/>
-            <p:nvPr>
-              <p:extLst>
-                <p:ext uri="{386F3935-93C4-4BCD-93E2-E3B085C9AB24}">
-                  <p16:designElem xmlns:p16="http://schemas.microsoft.com/office/powerpoint/2015/main" val="1"/>
-                </p:ext>
-              </p:extLst>
-            </p:nvPr>
-          </p:nvSpPr>
-          <p:spPr bwMode="auto">
-            <a:xfrm>
-              <a:off x="484188" y="0"/>
-              <a:ext cx="3421063" cy="6843713"/>
-            </a:xfrm>
-            <a:custGeom>
-              <a:avLst/>
-              <a:gdLst/>
-              <a:ahLst/>
-              <a:cxnLst/>
-              <a:rect l="0" t="0" r="r" b="b"/>
-              <a:pathLst>
-                <a:path w="720" h="1440">
-                  <a:moveTo>
-                    <a:pt x="720" y="0"/>
-                  </a:moveTo>
-                  <a:cubicBezTo>
-                    <a:pt x="316" y="282"/>
-                    <a:pt x="0" y="1018"/>
-                    <a:pt x="362" y="1440"/>
-                  </a:cubicBezTo>
-                </a:path>
-              </a:pathLst>
-            </a:custGeom>
-            <a:noFill/>
-            <a:ln w="9525" cap="flat">
-              <a:solidFill>
-                <a:schemeClr val="bg1">
-                  <a:alpha val="35000"/>
-                </a:schemeClr>
-              </a:solidFill>
-              <a:prstDash val="solid"/>
-              <a:miter lim="800000"/>
-              <a:headEnd/>
-              <a:tailEnd/>
-            </a:ln>
-            <a:extLst>
-              <a:ext uri="{909E8E84-426E-40DD-AFC4-6F175D3DCCD1}">
-                <a14:hiddenFill xmlns:a14="http://schemas.microsoft.com/office/drawing/2010/main">
-                  <a:solidFill>
-                    <a:srgbClr val="FFFFFF"/>
-                  </a:solidFill>
-                </a14:hiddenFill>
-              </a:ext>
-            </a:extLst>
-          </p:spPr>
-        </p:sp>
-        <p:sp>
-          <p:nvSpPr>
-            <p:cNvPr id="25" name="Freeform 19">
-              <a:extLst>
-                <a:ext uri="{FF2B5EF4-FFF2-40B4-BE49-F238E27FC236}">
-                  <a16:creationId xmlns:a16="http://schemas.microsoft.com/office/drawing/2014/main" id="{F99FF32E-3548-4B4D-894E-B3A06C12A763}"/>
-                </a:ext>
-                <a:ext uri="{C183D7F6-B498-43B3-948B-1728B52AA6E4}">
-                  <adec:decorative xmlns:adec="http://schemas.microsoft.com/office/drawing/2017/decorative" val="1"/>
-                </a:ext>
-              </a:extLst>
-            </p:cNvPr>
-            <p:cNvSpPr/>
-            <p:nvPr>
-              <p:extLst>
-                <p:ext uri="{386F3935-93C4-4BCD-93E2-E3B085C9AB24}">
-                  <p16:designElem xmlns:p16="http://schemas.microsoft.com/office/powerpoint/2015/main" val="1"/>
-                </p:ext>
-              </p:extLst>
-            </p:nvPr>
-          </p:nvSpPr>
-          <p:spPr bwMode="auto">
-            <a:xfrm>
-              <a:off x="11287125" y="6049963"/>
-              <a:ext cx="879475" cy="793750"/>
-            </a:xfrm>
-            <a:custGeom>
-              <a:avLst/>
-              <a:gdLst/>
-              <a:ahLst/>
-              <a:cxnLst/>
-              <a:rect l="0" t="0" r="r" b="b"/>
-              <a:pathLst>
-                <a:path w="185" h="167">
-                  <a:moveTo>
-                    <a:pt x="0" y="167"/>
-                  </a:moveTo>
-                  <a:cubicBezTo>
-                    <a:pt x="63" y="114"/>
-                    <a:pt x="125" y="58"/>
-                    <a:pt x="185" y="0"/>
-                  </a:cubicBezTo>
-                </a:path>
-              </a:pathLst>
-            </a:custGeom>
-            <a:noFill/>
-            <a:ln w="9525" cap="flat">
-              <a:solidFill>
-                <a:schemeClr val="bg1">
-                  <a:alpha val="35000"/>
-                </a:schemeClr>
-              </a:solidFill>
-              <a:prstDash val="solid"/>
-              <a:miter lim="800000"/>
-              <a:headEnd/>
-              <a:tailEnd/>
-            </a:ln>
-            <a:extLst>
-              <a:ext uri="{909E8E84-426E-40DD-AFC4-6F175D3DCCD1}">
-                <a14:hiddenFill xmlns:a14="http://schemas.microsoft.com/office/drawing/2010/main">
-                  <a:solidFill>
-                    <a:srgbClr val="FFFFFF"/>
-                  </a:solidFill>
-                </a14:hiddenFill>
-              </a:ext>
-            </a:extLst>
-          </p:spPr>
-        </p:sp>
-        <p:sp>
-          <p:nvSpPr>
-            <p:cNvPr id="26" name="Freeform 20">
-              <a:extLst>
-                <a:ext uri="{FF2B5EF4-FFF2-40B4-BE49-F238E27FC236}">
-                  <a16:creationId xmlns:a16="http://schemas.microsoft.com/office/drawing/2014/main" id="{5005D0D4-EFA9-4355-BA9B-A7B46F9412FA}"/>
-                </a:ext>
-                <a:ext uri="{C183D7F6-B498-43B3-948B-1728B52AA6E4}">
-                  <adec:decorative xmlns:adec="http://schemas.microsoft.com/office/drawing/2017/decorative" val="1"/>
-                </a:ext>
-              </a:extLst>
-            </p:cNvPr>
-            <p:cNvSpPr/>
-            <p:nvPr>
-              <p:extLst>
-                <p:ext uri="{386F3935-93C4-4BCD-93E2-E3B085C9AB24}">
-                  <p16:designElem xmlns:p16="http://schemas.microsoft.com/office/powerpoint/2015/main" val="1"/>
-                </p:ext>
-              </p:extLst>
-            </p:nvPr>
-          </p:nvSpPr>
-          <p:spPr bwMode="auto">
-            <a:xfrm>
-              <a:off x="598488" y="0"/>
-              <a:ext cx="2717800" cy="6843713"/>
-            </a:xfrm>
-            <a:custGeom>
-              <a:avLst/>
-              <a:gdLst/>
-              <a:ahLst/>
-              <a:cxnLst/>
-              <a:rect l="0" t="0" r="r" b="b"/>
-              <a:pathLst>
-                <a:path w="572" h="1440">
-                  <a:moveTo>
-                    <a:pt x="572" y="0"/>
-                  </a:moveTo>
-                  <a:cubicBezTo>
-                    <a:pt x="213" y="320"/>
-                    <a:pt x="0" y="979"/>
-                    <a:pt x="164" y="1440"/>
-                  </a:cubicBezTo>
-                </a:path>
-              </a:pathLst>
-            </a:custGeom>
-            <a:noFill/>
-            <a:ln w="12700" cap="flat">
-              <a:solidFill>
-                <a:schemeClr val="bg1">
-                  <a:alpha val="35000"/>
-                </a:schemeClr>
-              </a:solidFill>
-              <a:prstDash val="dashDot"/>
-              <a:miter lim="800000"/>
-              <a:headEnd/>
-              <a:tailEnd/>
-            </a:ln>
-            <a:extLst>
-              <a:ext uri="{909E8E84-426E-40DD-AFC4-6F175D3DCCD1}">
-                <a14:hiddenFill xmlns:a14="http://schemas.microsoft.com/office/drawing/2010/main">
-                  <a:solidFill>
-                    <a:srgbClr val="FFFFFF"/>
-                  </a:solidFill>
-                </a14:hiddenFill>
-              </a:ext>
-            </a:extLst>
-          </p:spPr>
-        </p:sp>
-        <p:sp>
-          <p:nvSpPr>
-            <p:cNvPr id="27" name="Freeform 21">
-              <a:extLst>
-                <a:ext uri="{FF2B5EF4-FFF2-40B4-BE49-F238E27FC236}">
-                  <a16:creationId xmlns:a16="http://schemas.microsoft.com/office/drawing/2014/main" id="{6350B02F-5937-44B9-83F4-9C970BE963AF}"/>
-                </a:ext>
-                <a:ext uri="{C183D7F6-B498-43B3-948B-1728B52AA6E4}">
-                  <adec:decorative xmlns:adec="http://schemas.microsoft.com/office/drawing/2017/decorative" val="1"/>
-                </a:ext>
-              </a:extLst>
-            </p:cNvPr>
-            <p:cNvSpPr/>
-            <p:nvPr>
-              <p:extLst>
-                <p:ext uri="{386F3935-93C4-4BCD-93E2-E3B085C9AB24}">
-                  <p16:designElem xmlns:p16="http://schemas.microsoft.com/office/powerpoint/2015/main" val="1"/>
-                </p:ext>
-              </p:extLst>
-            </p:nvPr>
-          </p:nvSpPr>
-          <p:spPr bwMode="auto">
-            <a:xfrm>
-              <a:off x="261938" y="0"/>
-              <a:ext cx="2944813" cy="6843713"/>
-            </a:xfrm>
-            <a:custGeom>
-              <a:avLst/>
-              <a:gdLst/>
-              <a:ahLst/>
-              <a:cxnLst/>
-              <a:rect l="0" t="0" r="r" b="b"/>
-              <a:pathLst>
-                <a:path w="620" h="1440">
-                  <a:moveTo>
-                    <a:pt x="620" y="0"/>
-                  </a:moveTo>
-                  <a:cubicBezTo>
-                    <a:pt x="248" y="325"/>
-                    <a:pt x="0" y="960"/>
-                    <a:pt x="186" y="1440"/>
-                  </a:cubicBezTo>
-                </a:path>
-              </a:pathLst>
-            </a:custGeom>
-            <a:noFill/>
-            <a:ln w="9525" cap="flat">
-              <a:solidFill>
-                <a:schemeClr val="bg1">
-                  <a:alpha val="35000"/>
-                </a:schemeClr>
-              </a:solidFill>
-              <a:prstDash val="lgDash"/>
-              <a:miter lim="800000"/>
-              <a:headEnd/>
-              <a:tailEnd/>
-            </a:ln>
-            <a:extLst>
-              <a:ext uri="{909E8E84-426E-40DD-AFC4-6F175D3DCCD1}">
-                <a14:hiddenFill xmlns:a14="http://schemas.microsoft.com/office/drawing/2010/main">
-                  <a:solidFill>
-                    <a:srgbClr val="FFFFFF"/>
-                  </a:solidFill>
-                </a14:hiddenFill>
-              </a:ext>
-            </a:extLst>
-          </p:spPr>
-        </p:sp>
-        <p:sp>
-          <p:nvSpPr>
-            <p:cNvPr id="28" name="Freeform 22">
-              <a:extLst>
-                <a:ext uri="{FF2B5EF4-FFF2-40B4-BE49-F238E27FC236}">
-                  <a16:creationId xmlns:a16="http://schemas.microsoft.com/office/drawing/2014/main" id="{F21A245F-C10F-495E-BD0E-CE576C7F0D7E}"/>
-                </a:ext>
-                <a:ext uri="{C183D7F6-B498-43B3-948B-1728B52AA6E4}">
-                  <adec:decorative xmlns:adec="http://schemas.microsoft.com/office/drawing/2017/decorative" val="1"/>
-                </a:ext>
-              </a:extLst>
-            </p:cNvPr>
-            <p:cNvSpPr/>
-            <p:nvPr>
-              <p:extLst>
-                <p:ext uri="{386F3935-93C4-4BCD-93E2-E3B085C9AB24}">
-                  <p16:designElem xmlns:p16="http://schemas.microsoft.com/office/powerpoint/2015/main" val="1"/>
-                </p:ext>
-              </p:extLst>
-            </p:nvPr>
-          </p:nvSpPr>
-          <p:spPr bwMode="auto">
-            <a:xfrm>
-              <a:off x="-417513" y="0"/>
-              <a:ext cx="2403475" cy="6843713"/>
-            </a:xfrm>
-            <a:custGeom>
-              <a:avLst/>
-              <a:gdLst/>
-              <a:ahLst/>
-              <a:cxnLst/>
-              <a:rect l="0" t="0" r="r" b="b"/>
-              <a:pathLst>
-                <a:path w="506" h="1440">
-                  <a:moveTo>
-                    <a:pt x="506" y="0"/>
-                  </a:moveTo>
-                  <a:cubicBezTo>
-                    <a:pt x="109" y="356"/>
-                    <a:pt x="0" y="943"/>
-                    <a:pt x="171" y="1440"/>
-                  </a:cubicBezTo>
-                </a:path>
-              </a:pathLst>
-            </a:custGeom>
-            <a:noFill/>
-            <a:ln w="9525" cap="flat">
-              <a:solidFill>
-                <a:schemeClr val="bg1">
-                  <a:alpha val="35000"/>
-                </a:schemeClr>
-              </a:solidFill>
-              <a:prstDash val="solid"/>
-              <a:miter lim="800000"/>
-              <a:headEnd/>
-              <a:tailEnd/>
-            </a:ln>
-            <a:extLst>
-              <a:ext uri="{909E8E84-426E-40DD-AFC4-6F175D3DCCD1}">
-                <a14:hiddenFill xmlns:a14="http://schemas.microsoft.com/office/drawing/2010/main">
-                  <a:solidFill>
-                    <a:srgbClr val="FFFFFF"/>
-                  </a:solidFill>
-                </a14:hiddenFill>
-              </a:ext>
-            </a:extLst>
-          </p:spPr>
-        </p:sp>
-        <p:sp>
-          <p:nvSpPr>
-            <p:cNvPr id="29" name="Freeform 23">
-              <a:extLst>
-                <a:ext uri="{FF2B5EF4-FFF2-40B4-BE49-F238E27FC236}">
-                  <a16:creationId xmlns:a16="http://schemas.microsoft.com/office/drawing/2014/main" id="{6F524856-7B56-403B-B504-044710FD5453}"/>
-                </a:ext>
-                <a:ext uri="{C183D7F6-B498-43B3-948B-1728B52AA6E4}">
-                  <adec:decorative xmlns:adec="http://schemas.microsoft.com/office/drawing/2017/decorative" val="1"/>
-                </a:ext>
-              </a:extLst>
-            </p:cNvPr>
-            <p:cNvSpPr/>
-            <p:nvPr>
-              <p:extLst>
-                <p:ext uri="{386F3935-93C4-4BCD-93E2-E3B085C9AB24}">
-                  <p16:designElem xmlns:p16="http://schemas.microsoft.com/office/powerpoint/2015/main" val="1"/>
-                </p:ext>
-              </p:extLst>
-            </p:nvPr>
-          </p:nvSpPr>
-          <p:spPr bwMode="auto">
-            <a:xfrm>
-              <a:off x="14288" y="9525"/>
-              <a:ext cx="1771650" cy="3198813"/>
-            </a:xfrm>
-            <a:custGeom>
-              <a:avLst/>
-              <a:gdLst/>
-              <a:ahLst/>
-              <a:cxnLst/>
-              <a:rect l="0" t="0" r="r" b="b"/>
-              <a:pathLst>
-                <a:path w="373" h="673">
-                  <a:moveTo>
-                    <a:pt x="373" y="0"/>
-                  </a:moveTo>
-                  <a:cubicBezTo>
-                    <a:pt x="175" y="183"/>
-                    <a:pt x="51" y="409"/>
-                    <a:pt x="0" y="673"/>
-                  </a:cubicBezTo>
-                </a:path>
-              </a:pathLst>
-            </a:custGeom>
-            <a:noFill/>
-            <a:ln w="9525" cap="flat">
-              <a:solidFill>
-                <a:schemeClr val="bg1">
-                  <a:alpha val="35000"/>
-                </a:schemeClr>
-              </a:solidFill>
-              <a:prstDash val="solid"/>
-              <a:miter lim="800000"/>
-              <a:headEnd/>
-              <a:tailEnd/>
-            </a:ln>
-            <a:extLst>
-              <a:ext uri="{909E8E84-426E-40DD-AFC4-6F175D3DCCD1}">
-                <a14:hiddenFill xmlns:a14="http://schemas.microsoft.com/office/drawing/2010/main">
-                  <a:solidFill>
-                    <a:srgbClr val="FFFFFF"/>
-                  </a:solidFill>
-                </a14:hiddenFill>
-              </a:ext>
-            </a:extLst>
-          </p:spPr>
-        </p:sp>
-        <p:sp>
-          <p:nvSpPr>
-            <p:cNvPr id="30" name="Freeform 24">
-              <a:extLst>
-                <a:ext uri="{FF2B5EF4-FFF2-40B4-BE49-F238E27FC236}">
-                  <a16:creationId xmlns:a16="http://schemas.microsoft.com/office/drawing/2014/main" id="{4E6D29BC-894B-4228-9F3F-92037EA39627}"/>
-                </a:ext>
-                <a:ext uri="{C183D7F6-B498-43B3-948B-1728B52AA6E4}">
-                  <adec:decorative xmlns:adec="http://schemas.microsoft.com/office/drawing/2017/decorative" val="1"/>
-                </a:ext>
-              </a:extLst>
-            </p:cNvPr>
-            <p:cNvSpPr/>
-            <p:nvPr>
-              <p:extLst>
-                <p:ext uri="{386F3935-93C4-4BCD-93E2-E3B085C9AB24}">
-                  <p16:designElem xmlns:p16="http://schemas.microsoft.com/office/powerpoint/2015/main" val="1"/>
-                </p:ext>
-              </p:extLst>
-            </p:nvPr>
-          </p:nvSpPr>
-          <p:spPr bwMode="auto">
-            <a:xfrm>
-              <a:off x="4763" y="6016625"/>
-              <a:ext cx="214313" cy="827088"/>
-            </a:xfrm>
-            <a:custGeom>
-              <a:avLst/>
-              <a:gdLst/>
-              <a:ahLst/>
-              <a:cxnLst/>
-              <a:rect l="0" t="0" r="r" b="b"/>
-              <a:pathLst>
-                <a:path w="45" h="174">
-                  <a:moveTo>
-                    <a:pt x="0" y="0"/>
-                  </a:moveTo>
-                  <a:cubicBezTo>
-                    <a:pt x="11" y="59"/>
-                    <a:pt x="26" y="118"/>
-                    <a:pt x="45" y="174"/>
-                  </a:cubicBezTo>
-                </a:path>
-              </a:pathLst>
-            </a:custGeom>
-            <a:noFill/>
-            <a:ln w="9525" cap="flat">
-              <a:solidFill>
-                <a:schemeClr val="bg1">
-                  <a:alpha val="35000"/>
-                </a:schemeClr>
-              </a:solidFill>
-              <a:prstDash val="solid"/>
-              <a:miter lim="800000"/>
-              <a:headEnd/>
-              <a:tailEnd/>
-            </a:ln>
-            <a:extLst>
-              <a:ext uri="{909E8E84-426E-40DD-AFC4-6F175D3DCCD1}">
-                <a14:hiddenFill xmlns:a14="http://schemas.microsoft.com/office/drawing/2010/main">
-                  <a:solidFill>
-                    <a:srgbClr val="FFFFFF"/>
-                  </a:solidFill>
-                </a14:hiddenFill>
-              </a:ext>
-            </a:extLst>
-          </p:spPr>
-        </p:sp>
-        <p:sp>
-          <p:nvSpPr>
-            <p:cNvPr id="31" name="Freeform 25">
-              <a:extLst>
-                <a:ext uri="{FF2B5EF4-FFF2-40B4-BE49-F238E27FC236}">
-                  <a16:creationId xmlns:a16="http://schemas.microsoft.com/office/drawing/2014/main" id="{E03B2DC6-DF02-45CB-AC7C-6EBBD359C384}"/>
-                </a:ext>
-                <a:ext uri="{C183D7F6-B498-43B3-948B-1728B52AA6E4}">
-                  <adec:decorative xmlns:adec="http://schemas.microsoft.com/office/drawing/2017/decorative" val="1"/>
-                </a:ext>
-              </a:extLst>
-            </p:cNvPr>
-            <p:cNvSpPr/>
-            <p:nvPr>
-              <p:extLst>
-                <p:ext uri="{386F3935-93C4-4BCD-93E2-E3B085C9AB24}">
-                  <p16:designElem xmlns:p16="http://schemas.microsoft.com/office/powerpoint/2015/main" val="1"/>
-                </p:ext>
-              </p:extLst>
-            </p:nvPr>
-          </p:nvSpPr>
-          <p:spPr bwMode="auto">
-            <a:xfrm>
-              <a:off x="14288" y="0"/>
-              <a:ext cx="1562100" cy="2228850"/>
-            </a:xfrm>
-            <a:custGeom>
-              <a:avLst/>
-              <a:gdLst/>
-              <a:ahLst/>
-              <a:cxnLst/>
-              <a:rect l="0" t="0" r="r" b="b"/>
-              <a:pathLst>
-                <a:path w="329" h="469">
-                  <a:moveTo>
-                    <a:pt x="329" y="0"/>
-                  </a:moveTo>
-                  <a:cubicBezTo>
-                    <a:pt x="189" y="133"/>
-                    <a:pt x="69" y="288"/>
-                    <a:pt x="0" y="469"/>
-                  </a:cubicBezTo>
-                </a:path>
-              </a:pathLst>
-            </a:custGeom>
-            <a:noFill/>
-            <a:ln w="9525" cap="flat">
-              <a:solidFill>
-                <a:schemeClr val="bg1">
-                  <a:alpha val="35000"/>
-                </a:schemeClr>
-              </a:solidFill>
-              <a:prstDash val="solid"/>
-              <a:miter lim="800000"/>
-              <a:headEnd/>
-              <a:tailEnd/>
-            </a:ln>
-            <a:extLst>
-              <a:ext uri="{909E8E84-426E-40DD-AFC4-6F175D3DCCD1}">
-                <a14:hiddenFill xmlns:a14="http://schemas.microsoft.com/office/drawing/2010/main">
-                  <a:solidFill>
-                    <a:srgbClr val="FFFFFF"/>
-                  </a:solidFill>
-                </a14:hiddenFill>
-              </a:ext>
-            </a:extLst>
-          </p:spPr>
-        </p:sp>
-      </p:grpSp>
-      <p:sp useBgFill="1">
-        <p:nvSpPr>
-          <p:cNvPr id="33" name="Rectangle 32">
-            <a:extLst>
-              <a:ext uri="{FF2B5EF4-FFF2-40B4-BE49-F238E27FC236}">
-                <a16:creationId xmlns:a16="http://schemas.microsoft.com/office/drawing/2014/main" id="{700D0C16-8549-4373-8B7C-3555082CEA0B}"/>
-              </a:ext>
-              <a:ext uri="{C183D7F6-B498-43B3-948B-1728B52AA6E4}">
-                <adec:decorative xmlns:adec="http://schemas.microsoft.com/office/drawing/2017/decorative" val="1"/>
-              </a:ext>
-            </a:extLst>
-          </p:cNvPr>
-          <p:cNvSpPr>
-            <a:spLocks noGrp="1" noRot="1" noChangeAspect="1" noMove="1" noResize="1" noEditPoints="1" noAdjustHandles="1" noChangeArrowheads="1" noChangeShapeType="1" noTextEdit="1"/>
-          </p:cNvSpPr>
-          <p:nvPr>
-            <p:extLst>
-              <p:ext uri="{386F3935-93C4-4BCD-93E2-E3B085C9AB24}">
-                <p16:designElem xmlns:p16="http://schemas.microsoft.com/office/powerpoint/2015/main" val="1"/>
-              </p:ext>
-            </p:extLst>
-          </p:nvPr>
-        </p:nvSpPr>
-        <p:spPr>
-          <a:xfrm>
-            <a:off x="1923664" y="0"/>
-            <a:ext cx="10268336" cy="6869208"/>
           </a:xfrm>
           <a:prstGeom prst="rect">
             <a:avLst/>
@@ -7592,62 +6083,216 @@
       </p:sp>
       <p:sp>
         <p:nvSpPr>
-          <p:cNvPr id="2" name="Nadpis 1">
+          <p:cNvPr id="53" name="Freeform 6">
             <a:extLst>
               <a:ext uri="{FF2B5EF4-FFF2-40B4-BE49-F238E27FC236}">
-                <a16:creationId xmlns:a16="http://schemas.microsoft.com/office/drawing/2014/main" id="{BD6671BA-8EF0-4615-A207-8F0C302FF377}"/>
+                <a16:creationId xmlns:a16="http://schemas.microsoft.com/office/drawing/2014/main" id="{A779A851-95D6-41AF-937A-B0E4B7F6FA8D}"/>
+              </a:ext>
+              <a:ext uri="{C183D7F6-B498-43B3-948B-1728B52AA6E4}">
+                <adec:decorative xmlns:adec="http://schemas.microsoft.com/office/drawing/2017/decorative" val="1"/>
               </a:ext>
             </a:extLst>
           </p:cNvPr>
           <p:cNvSpPr>
-            <a:spLocks noGrp="1"/>
+            <a:spLocks noGrp="1" noRot="1" noChangeAspect="1" noMove="1" noResize="1" noEditPoints="1" noAdjustHandles="1" noChangeArrowheads="1" noChangeShapeType="1" noTextEdit="1"/>
           </p:cNvSpPr>
           <p:nvPr>
-            <p:ph type="title"/>
+            <p:extLst>
+              <p:ext uri="{386F3935-93C4-4BCD-93E2-E3B085C9AB24}">
+                <p16:designElem xmlns:p16="http://schemas.microsoft.com/office/powerpoint/2015/main" val="1"/>
+              </p:ext>
+            </p:extLst>
           </p:nvPr>
         </p:nvSpPr>
-        <p:spPr>
+        <p:spPr bwMode="auto">
           <a:xfrm>
-            <a:off x="2880360" y="841248"/>
-            <a:ext cx="6227064" cy="1234440"/>
+            <a:off x="4142164" y="900814"/>
+            <a:ext cx="759618" cy="5710965"/>
           </a:xfrm>
+          <a:custGeom>
+            <a:avLst/>
+            <a:gdLst>
+              <a:gd name="T0" fmla="*/ 414 w 414"/>
+              <a:gd name="T1" fmla="*/ 2447 h 2447"/>
+              <a:gd name="T2" fmla="*/ 0 w 414"/>
+              <a:gd name="T3" fmla="*/ 2247 h 2447"/>
+              <a:gd name="T4" fmla="*/ 0 w 414"/>
+              <a:gd name="T5" fmla="*/ 0 h 2447"/>
+              <a:gd name="T6" fmla="*/ 414 w 414"/>
+              <a:gd name="T7" fmla="*/ 200 h 2447"/>
+              <a:gd name="T8" fmla="*/ 414 w 414"/>
+              <a:gd name="T9" fmla="*/ 2447 h 2447"/>
+            </a:gdLst>
+            <a:ahLst/>
+            <a:cxnLst>
+              <a:cxn ang="0">
+                <a:pos x="T0" y="T1"/>
+              </a:cxn>
+              <a:cxn ang="0">
+                <a:pos x="T2" y="T3"/>
+              </a:cxn>
+              <a:cxn ang="0">
+                <a:pos x="T4" y="T5"/>
+              </a:cxn>
+              <a:cxn ang="0">
+                <a:pos x="T6" y="T7"/>
+              </a:cxn>
+              <a:cxn ang="0">
+                <a:pos x="T8" y="T9"/>
+              </a:cxn>
+            </a:cxnLst>
+            <a:rect l="0" t="0" r="r" b="b"/>
+            <a:pathLst>
+              <a:path w="414" h="2447">
+                <a:moveTo>
+                  <a:pt x="414" y="2447"/>
+                </a:moveTo>
+                <a:lnTo>
+                  <a:pt x="0" y="2247"/>
+                </a:lnTo>
+                <a:lnTo>
+                  <a:pt x="0" y="0"/>
+                </a:lnTo>
+                <a:lnTo>
+                  <a:pt x="414" y="200"/>
+                </a:lnTo>
+                <a:lnTo>
+                  <a:pt x="414" y="2447"/>
+                </a:lnTo>
+                <a:close/>
+              </a:path>
+            </a:pathLst>
+          </a:custGeom>
+          <a:solidFill>
+            <a:schemeClr val="accent1">
+              <a:lumMod val="75000"/>
+            </a:schemeClr>
+          </a:solidFill>
+          <a:ln>
+            <a:noFill/>
+          </a:ln>
         </p:spPr>
         <p:txBody>
-          <a:bodyPr anchor="t">
-            <a:normAutofit/>
+          <a:bodyPr vert="horz" wrap="square" lIns="91440" tIns="45720" rIns="91440" bIns="45720" numCol="1" anchor="t" anchorCtr="0" compatLnSpc="1">
+            <a:prstTxWarp prst="textNoShape">
+              <a:avLst/>
+            </a:prstTxWarp>
           </a:bodyPr>
           <a:lstStyle/>
           <a:p>
-            <a:r>
-              <a:rPr lang="en-GB" sz="4000" dirty="0" err="1">
-                <a:solidFill>
-                  <a:schemeClr val="accent1"/>
-                </a:solidFill>
-              </a:rPr>
-              <a:t>Príncip</a:t>
-            </a:r>
-            <a:r>
-              <a:rPr lang="en-GB" sz="4000" dirty="0">
-                <a:solidFill>
-                  <a:schemeClr val="accent1"/>
-                </a:solidFill>
-              </a:rPr>
-              <a:t> PBL</a:t>
-            </a:r>
-            <a:endParaRPr lang="cs-CZ" sz="4000" dirty="0">
-              <a:solidFill>
-                <a:schemeClr val="accent1"/>
-              </a:solidFill>
-            </a:endParaRPr>
+            <a:endParaRPr lang="en-US"/>
           </a:p>
         </p:txBody>
       </p:sp>
       <p:sp>
         <p:nvSpPr>
-          <p:cNvPr id="35" name="Isosceles Triangle 34">
+          <p:cNvPr id="54" name="Freeform 7">
             <a:extLst>
               <a:ext uri="{FF2B5EF4-FFF2-40B4-BE49-F238E27FC236}">
-                <a16:creationId xmlns:a16="http://schemas.microsoft.com/office/drawing/2014/main" id="{C7341777-0F86-4E1E-A07F-2076F00D04EC}"/>
+                <a16:creationId xmlns:a16="http://schemas.microsoft.com/office/drawing/2014/main" id="{953FB2E7-B6CB-429C-81EB-D9516D6D5C8D}"/>
+              </a:ext>
+              <a:ext uri="{C183D7F6-B498-43B3-948B-1728B52AA6E4}">
+                <adec:decorative xmlns:adec="http://schemas.microsoft.com/office/drawing/2017/decorative" val="1"/>
+              </a:ext>
+            </a:extLst>
+          </p:cNvPr>
+          <p:cNvSpPr>
+            <a:spLocks noGrp="1" noRot="1" noChangeAspect="1" noMove="1" noResize="1" noEditPoints="1" noAdjustHandles="1" noChangeArrowheads="1" noChangeShapeType="1" noTextEdit="1"/>
+          </p:cNvSpPr>
+          <p:nvPr>
+            <p:extLst>
+              <p:ext uri="{386F3935-93C4-4BCD-93E2-E3B085C9AB24}">
+                <p16:designElem xmlns:p16="http://schemas.microsoft.com/office/powerpoint/2015/main" val="1"/>
+              </p:ext>
+            </p:extLst>
+          </p:nvPr>
+        </p:nvSpPr>
+        <p:spPr bwMode="auto">
+          <a:xfrm>
+            <a:off x="4144437" y="633165"/>
+            <a:ext cx="482654" cy="5521414"/>
+          </a:xfrm>
+          <a:custGeom>
+            <a:avLst/>
+            <a:gdLst>
+              <a:gd name="T0" fmla="*/ 209 w 209"/>
+              <a:gd name="T1" fmla="*/ 2246 h 2358"/>
+              <a:gd name="T2" fmla="*/ 0 w 209"/>
+              <a:gd name="T3" fmla="*/ 2358 h 2358"/>
+              <a:gd name="T4" fmla="*/ 0 w 209"/>
+              <a:gd name="T5" fmla="*/ 111 h 2358"/>
+              <a:gd name="T6" fmla="*/ 209 w 209"/>
+              <a:gd name="T7" fmla="*/ 0 h 2358"/>
+              <a:gd name="T8" fmla="*/ 209 w 209"/>
+              <a:gd name="T9" fmla="*/ 2246 h 2358"/>
+            </a:gdLst>
+            <a:ahLst/>
+            <a:cxnLst>
+              <a:cxn ang="0">
+                <a:pos x="T0" y="T1"/>
+              </a:cxn>
+              <a:cxn ang="0">
+                <a:pos x="T2" y="T3"/>
+              </a:cxn>
+              <a:cxn ang="0">
+                <a:pos x="T4" y="T5"/>
+              </a:cxn>
+              <a:cxn ang="0">
+                <a:pos x="T6" y="T7"/>
+              </a:cxn>
+              <a:cxn ang="0">
+                <a:pos x="T8" y="T9"/>
+              </a:cxn>
+            </a:cxnLst>
+            <a:rect l="0" t="0" r="r" b="b"/>
+            <a:pathLst>
+              <a:path w="209" h="2358">
+                <a:moveTo>
+                  <a:pt x="209" y="2246"/>
+                </a:moveTo>
+                <a:lnTo>
+                  <a:pt x="0" y="2358"/>
+                </a:lnTo>
+                <a:lnTo>
+                  <a:pt x="0" y="111"/>
+                </a:lnTo>
+                <a:lnTo>
+                  <a:pt x="209" y="0"/>
+                </a:lnTo>
+                <a:lnTo>
+                  <a:pt x="209" y="2246"/>
+                </a:lnTo>
+                <a:close/>
+              </a:path>
+            </a:pathLst>
+          </a:custGeom>
+          <a:solidFill>
+            <a:schemeClr val="accent1">
+              <a:lumMod val="50000"/>
+            </a:schemeClr>
+          </a:solidFill>
+          <a:ln>
+            <a:noFill/>
+          </a:ln>
+        </p:spPr>
+        <p:txBody>
+          <a:bodyPr vert="horz" wrap="square" lIns="91440" tIns="45720" rIns="91440" bIns="45720" numCol="1" anchor="t" anchorCtr="0" compatLnSpc="1">
+            <a:prstTxWarp prst="textNoShape">
+              <a:avLst/>
+            </a:prstTxWarp>
+          </a:bodyPr>
+          <a:lstStyle/>
+          <a:p>
+            <a:endParaRPr lang="en-US"/>
+          </a:p>
+        </p:txBody>
+      </p:sp>
+      <p:sp>
+        <p:nvSpPr>
+          <p:cNvPr id="55" name="Freeform: Shape 45">
+            <a:extLst>
+              <a:ext uri="{FF2B5EF4-FFF2-40B4-BE49-F238E27FC236}">
+                <a16:creationId xmlns:a16="http://schemas.microsoft.com/office/drawing/2014/main" id="{2EC40DB1-B719-4A13-9A4D-0966B4B27866}"/>
               </a:ext>
               <a:ext uri="{C183D7F6-B498-43B3-948B-1728B52AA6E4}">
                 <adec:decorative xmlns:adec="http://schemas.microsoft.com/office/drawing/2017/decorative" val="1"/>
@@ -7666,15 +6311,60 @@
           </p:nvPr>
         </p:nvSpPr>
         <p:spPr>
-          <a:xfrm rot="5400000">
-            <a:off x="1797903" y="954813"/>
-            <a:ext cx="300774" cy="259288"/>
+          <a:xfrm>
+            <a:off x="634621" y="636723"/>
+            <a:ext cx="4000062" cy="5257799"/>
           </a:xfrm>
-          <a:prstGeom prst="triangle">
+          <a:custGeom>
             <a:avLst/>
-          </a:prstGeom>
+            <a:gdLst>
+              <a:gd name="connsiteX0" fmla="*/ 0 w 4634682"/>
+              <a:gd name="connsiteY0" fmla="*/ 0 h 5257799"/>
+              <a:gd name="connsiteX1" fmla="*/ 4634682 w 4634682"/>
+              <a:gd name="connsiteY1" fmla="*/ 0 h 5257799"/>
+              <a:gd name="connsiteX2" fmla="*/ 4634682 w 4634682"/>
+              <a:gd name="connsiteY2" fmla="*/ 5257799 h 5257799"/>
+              <a:gd name="connsiteX3" fmla="*/ 0 w 4634682"/>
+              <a:gd name="connsiteY3" fmla="*/ 5257799 h 5257799"/>
+            </a:gdLst>
+            <a:ahLst/>
+            <a:cxnLst>
+              <a:cxn ang="0">
+                <a:pos x="connsiteX0" y="connsiteY0"/>
+              </a:cxn>
+              <a:cxn ang="0">
+                <a:pos x="connsiteX1" y="connsiteY1"/>
+              </a:cxn>
+              <a:cxn ang="0">
+                <a:pos x="connsiteX2" y="connsiteY2"/>
+              </a:cxn>
+              <a:cxn ang="0">
+                <a:pos x="connsiteX3" y="connsiteY3"/>
+              </a:cxn>
+            </a:cxnLst>
+            <a:rect l="l" t="t" r="r" b="b"/>
+            <a:pathLst>
+              <a:path w="4634682" h="5257799">
+                <a:moveTo>
+                  <a:pt x="0" y="0"/>
+                </a:moveTo>
+                <a:lnTo>
+                  <a:pt x="4634682" y="0"/>
+                </a:lnTo>
+                <a:lnTo>
+                  <a:pt x="4634682" y="5257799"/>
+                </a:lnTo>
+                <a:lnTo>
+                  <a:pt x="0" y="5257799"/>
+                </a:lnTo>
+                <a:close/>
+              </a:path>
+            </a:pathLst>
+          </a:custGeom>
           <a:solidFill>
-            <a:schemeClr val="accent1"/>
+            <a:schemeClr val="accent1">
+              <a:lumMod val="50000"/>
+            </a:schemeClr>
           </a:solidFill>
           <a:ln>
             <a:noFill/>
@@ -7697,10 +6387,107 @@
           </a:fontRef>
         </p:style>
         <p:txBody>
-          <a:bodyPr/>
+          <a:bodyPr wrap="square" rtlCol="0" anchor="ctr">
+            <a:noAutofit/>
+          </a:bodyPr>
           <a:lstStyle/>
           <a:p>
-            <a:endParaRPr lang="en-US" dirty="0"/>
+            <a:pPr algn="ctr"/>
+            <a:endParaRPr lang="en-US"/>
+          </a:p>
+        </p:txBody>
+      </p:sp>
+      <p:sp>
+        <p:nvSpPr>
+          <p:cNvPr id="2" name="Nadpis 1">
+            <a:extLst>
+              <a:ext uri="{FF2B5EF4-FFF2-40B4-BE49-F238E27FC236}">
+                <a16:creationId xmlns:a16="http://schemas.microsoft.com/office/drawing/2014/main" id="{BD6671BA-8EF0-4615-A207-8F0C302FF377}"/>
+              </a:ext>
+            </a:extLst>
+          </p:cNvPr>
+          <p:cNvSpPr>
+            <a:spLocks noGrp="1"/>
+          </p:cNvSpPr>
+          <p:nvPr>
+            <p:ph type="title"/>
+          </p:nvPr>
+        </p:nvSpPr>
+        <p:spPr>
+          <a:xfrm>
+            <a:off x="934872" y="982272"/>
+            <a:ext cx="3388419" cy="4560970"/>
+          </a:xfrm>
+        </p:spPr>
+        <p:txBody>
+          <a:bodyPr>
+            <a:normAutofit/>
+          </a:bodyPr>
+          <a:lstStyle/>
+          <a:p>
+            <a:r>
+              <a:rPr lang="en-GB" sz="4000">
+                <a:solidFill>
+                  <a:srgbClr val="FFFFFF"/>
+                </a:solidFill>
+              </a:rPr>
+              <a:t>Príncip PBL</a:t>
+            </a:r>
+            <a:endParaRPr lang="cs-CZ" sz="4000">
+              <a:solidFill>
+                <a:srgbClr val="FFFFFF"/>
+              </a:solidFill>
+            </a:endParaRPr>
+          </a:p>
+        </p:txBody>
+      </p:sp>
+      <p:sp>
+        <p:nvSpPr>
+          <p:cNvPr id="56" name="Rectangle 8">
+            <a:extLst>
+              <a:ext uri="{FF2B5EF4-FFF2-40B4-BE49-F238E27FC236}">
+                <a16:creationId xmlns:a16="http://schemas.microsoft.com/office/drawing/2014/main" id="{82211336-CFF3-412D-868A-6679C1004C45}"/>
+              </a:ext>
+              <a:ext uri="{C183D7F6-B498-43B3-948B-1728B52AA6E4}">
+                <adec:decorative xmlns:adec="http://schemas.microsoft.com/office/drawing/2017/decorative" val="1"/>
+              </a:ext>
+            </a:extLst>
+          </p:cNvPr>
+          <p:cNvSpPr>
+            <a:spLocks noGrp="1" noRot="1" noChangeAspect="1" noMove="1" noResize="1" noEditPoints="1" noAdjustHandles="1" noChangeArrowheads="1" noChangeShapeType="1" noTextEdit="1"/>
+          </p:cNvSpPr>
+          <p:nvPr>
+            <p:extLst>
+              <p:ext uri="{386F3935-93C4-4BCD-93E2-E3B085C9AB24}">
+                <p16:designElem xmlns:p16="http://schemas.microsoft.com/office/powerpoint/2015/main" val="1"/>
+              </p:ext>
+            </p:extLst>
+          </p:nvPr>
+        </p:nvSpPr>
+        <p:spPr bwMode="auto">
+          <a:xfrm>
+            <a:off x="4901782" y="1352302"/>
+            <a:ext cx="6655597" cy="5251646"/>
+          </a:xfrm>
+          <a:prstGeom prst="rect">
+            <a:avLst/>
+          </a:prstGeom>
+          <a:solidFill>
+            <a:schemeClr val="accent1"/>
+          </a:solidFill>
+          <a:ln>
+            <a:noFill/>
+          </a:ln>
+        </p:spPr>
+        <p:txBody>
+          <a:bodyPr vert="horz" wrap="square" lIns="91440" tIns="45720" rIns="91440" bIns="45720" numCol="1" anchor="t" anchorCtr="0" compatLnSpc="1">
+            <a:prstTxWarp prst="textNoShape">
+              <a:avLst/>
+            </a:prstTxWarp>
+          </a:bodyPr>
+          <a:lstStyle/>
+          <a:p>
+            <a:endParaRPr lang="en-US"/>
           </a:p>
         </p:txBody>
       </p:sp>
@@ -7722,469 +6509,247 @@
         </p:nvSpPr>
         <p:spPr>
           <a:xfrm>
-            <a:off x="2880360" y="1877745"/>
-            <a:ext cx="7505066" cy="5178199"/>
+            <a:off x="5221862" y="1719618"/>
+            <a:ext cx="5948831" cy="4334629"/>
           </a:xfrm>
         </p:spPr>
         <p:txBody>
-          <a:bodyPr>
+          <a:bodyPr anchor="ctr">
             <a:normAutofit/>
           </a:bodyPr>
           <a:lstStyle/>
           <a:p>
-            <a:pPr algn="just"/>
-            <a:r>
-              <a:rPr lang="cs-CZ" sz="3200" dirty="0"/>
-              <a:t>8 </a:t>
-            </a:r>
-            <a:r>
-              <a:rPr lang="cs-CZ" sz="3200" dirty="0" err="1"/>
-              <a:t>príncipov</a:t>
-            </a:r>
-            <a:r>
-              <a:rPr lang="en-GB" sz="3200" dirty="0"/>
+            <a:r>
+              <a:rPr lang="cs-CZ" sz="1900">
+                <a:solidFill>
+                  <a:srgbClr val="FEFFFF"/>
+                </a:solidFill>
+              </a:rPr>
+              <a:t>8 príncipov</a:t>
+            </a:r>
+            <a:r>
+              <a:rPr lang="en-GB" sz="1900">
+                <a:solidFill>
+                  <a:srgbClr val="FEFFFF"/>
+                </a:solidFill>
+              </a:rPr>
               <a:t>:</a:t>
             </a:r>
-            <a:endParaRPr lang="cs-CZ" sz="3200" dirty="0"/>
-          </a:p>
-          <a:p>
-            <a:pPr marL="800100" lvl="1" indent="-342900" algn="just">
+            <a:endParaRPr lang="cs-CZ" sz="1900">
+              <a:solidFill>
+                <a:srgbClr val="FEFFFF"/>
+              </a:solidFill>
+            </a:endParaRPr>
+          </a:p>
+          <a:p>
+            <a:pPr marL="800100" lvl="1" indent="-342900">
               <a:buFont typeface="+mj-lt"/>
               <a:buAutoNum type="arabicPeriod"/>
             </a:pPr>
             <a:r>
-              <a:rPr lang="pl-PL" sz="2000" b="0" i="0" dirty="0">
+              <a:rPr lang="pl-PL" sz="1900" b="0" i="0">
+                <a:solidFill>
+                  <a:srgbClr val="FEFFFF"/>
+                </a:solidFill>
                 <a:effectLst/>
                 <a:latin typeface="Arial" panose="020B0604020202020204" pitchFamily="34" charset="0"/>
               </a:rPr>
               <a:t>Vytvorenie danej úlohy alebo problému</a:t>
             </a:r>
-            <a:endParaRPr lang="en-GB" sz="2000" b="0" i="0" dirty="0">
+            <a:endParaRPr lang="en-GB" sz="1900" b="0" i="0">
+              <a:solidFill>
+                <a:srgbClr val="FEFFFF"/>
+              </a:solidFill>
               <a:effectLst/>
               <a:latin typeface="Arial" panose="020B0604020202020204" pitchFamily="34" charset="0"/>
             </a:endParaRPr>
           </a:p>
           <a:p>
-            <a:pPr marL="800100" lvl="1" indent="-342900" algn="just">
+            <a:pPr marL="800100" lvl="1" indent="-342900">
               <a:buFont typeface="+mj-lt"/>
               <a:buAutoNum type="arabicPeriod"/>
             </a:pPr>
             <a:r>
-              <a:rPr lang="cs-CZ" sz="2000" b="0" i="0" dirty="0" err="1">
+              <a:rPr lang="cs-CZ" sz="1900" b="0" i="0">
+                <a:solidFill>
+                  <a:srgbClr val="FEFFFF"/>
+                </a:solidFill>
                 <a:effectLst/>
                 <a:latin typeface="Arial" panose="020B0604020202020204" pitchFamily="34" charset="0"/>
               </a:rPr>
-              <a:t>Zhromaždenie</a:t>
-            </a:r>
-            <a:r>
-              <a:rPr lang="cs-CZ" sz="2000" b="0" i="0" dirty="0">
-                <a:effectLst/>
-                <a:latin typeface="Arial" panose="020B0604020202020204" pitchFamily="34" charset="0"/>
-              </a:rPr>
-              <a:t> </a:t>
-            </a:r>
-            <a:r>
-              <a:rPr lang="cs-CZ" sz="2000" b="0" i="0" dirty="0" err="1">
-                <a:effectLst/>
-                <a:latin typeface="Arial" panose="020B0604020202020204" pitchFamily="34" charset="0"/>
-              </a:rPr>
-              <a:t>aktivít</a:t>
-            </a:r>
-            <a:r>
-              <a:rPr lang="cs-CZ" sz="2000" b="0" i="0" dirty="0">
-                <a:effectLst/>
-                <a:latin typeface="Arial" panose="020B0604020202020204" pitchFamily="34" charset="0"/>
-              </a:rPr>
-              <a:t> </a:t>
-            </a:r>
-            <a:endParaRPr lang="en-GB" sz="2000" b="0" i="0" dirty="0">
+              <a:t>Zhromaždenie aktivít </a:t>
+            </a:r>
+            <a:endParaRPr lang="en-GB" sz="1900" b="0" i="0">
+              <a:solidFill>
+                <a:srgbClr val="FEFFFF"/>
+              </a:solidFill>
               <a:effectLst/>
               <a:latin typeface="Arial" panose="020B0604020202020204" pitchFamily="34" charset="0"/>
             </a:endParaRPr>
           </a:p>
           <a:p>
-            <a:pPr marL="800100" lvl="1" indent="-342900" algn="just">
+            <a:pPr marL="800100" lvl="1" indent="-342900">
               <a:buFont typeface="+mj-lt"/>
               <a:buAutoNum type="arabicPeriod"/>
             </a:pPr>
             <a:r>
-              <a:rPr lang="en-GB" sz="2000" b="0" i="0" dirty="0">
+              <a:rPr lang="en-GB" sz="1900" b="0" i="0">
+                <a:solidFill>
+                  <a:srgbClr val="FEFFFF"/>
+                </a:solidFill>
                 <a:effectLst/>
                 <a:latin typeface="Arial" panose="020B0604020202020204" pitchFamily="34" charset="0"/>
               </a:rPr>
               <a:t>Z</a:t>
             </a:r>
             <a:r>
-              <a:rPr lang="pl-PL" sz="2000" b="0" i="0" dirty="0">
+              <a:rPr lang="pl-PL" sz="1900" b="0" i="0">
+                <a:solidFill>
+                  <a:srgbClr val="FEFFFF"/>
+                </a:solidFill>
                 <a:effectLst/>
                 <a:latin typeface="Arial" panose="020B0604020202020204" pitchFamily="34" charset="0"/>
               </a:rPr>
               <a:t>ainteresovanie študenta</a:t>
             </a:r>
-            <a:endParaRPr lang="en-GB" sz="2000" b="0" i="0" dirty="0">
+            <a:endParaRPr lang="en-GB" sz="1900" b="0" i="0">
+              <a:solidFill>
+                <a:srgbClr val="FEFFFF"/>
+              </a:solidFill>
               <a:effectLst/>
               <a:latin typeface="Arial" panose="020B0604020202020204" pitchFamily="34" charset="0"/>
             </a:endParaRPr>
           </a:p>
           <a:p>
-            <a:pPr marL="800100" lvl="1" indent="-342900" algn="just">
+            <a:pPr marL="800100" lvl="1" indent="-342900">
               <a:buFont typeface="+mj-lt"/>
               <a:buAutoNum type="arabicPeriod"/>
             </a:pPr>
             <a:r>
-              <a:rPr lang="cs-CZ" sz="2000" b="0" i="0" dirty="0">
+              <a:rPr lang="cs-CZ" sz="1900" b="0" i="0">
+                <a:solidFill>
+                  <a:srgbClr val="FEFFFF"/>
+                </a:solidFill>
                 <a:effectLst/>
                 <a:latin typeface="Arial" panose="020B0604020202020204" pitchFamily="34" charset="0"/>
               </a:rPr>
-              <a:t>Návrh </a:t>
-            </a:r>
-            <a:r>
-              <a:rPr lang="cs-CZ" sz="2000" b="0" i="0" dirty="0" err="1">
+              <a:t>Návrh učebného prostredia a zadania pre študentov</a:t>
+            </a:r>
+            <a:endParaRPr lang="en-GB" sz="1900" b="0" i="0">
+              <a:solidFill>
+                <a:srgbClr val="FEFFFF"/>
+              </a:solidFill>
+              <a:effectLst/>
+              <a:latin typeface="Arial" panose="020B0604020202020204" pitchFamily="34" charset="0"/>
+            </a:endParaRPr>
+          </a:p>
+          <a:p>
+            <a:pPr marL="800100" lvl="1" indent="-342900">
+              <a:buFont typeface="+mj-lt"/>
+              <a:buAutoNum type="arabicPeriod"/>
+            </a:pPr>
+            <a:r>
+              <a:rPr lang="cs-CZ" sz="1900" b="0" i="0">
+                <a:solidFill>
+                  <a:srgbClr val="FEFFFF"/>
+                </a:solidFill>
                 <a:effectLst/>
                 <a:latin typeface="Arial" panose="020B0604020202020204" pitchFamily="34" charset="0"/>
               </a:rPr>
-              <a:t>učebného</a:t>
-            </a:r>
-            <a:r>
-              <a:rPr lang="cs-CZ" sz="2000" b="0" i="0" dirty="0">
+              <a:t>Poskytnutie vlastníctva procesu študentov na vyriešenie problému</a:t>
+            </a:r>
+            <a:endParaRPr lang="en-GB" sz="1900" b="0" i="0">
+              <a:solidFill>
+                <a:srgbClr val="FEFFFF"/>
+              </a:solidFill>
+              <a:effectLst/>
+              <a:latin typeface="Arial" panose="020B0604020202020204" pitchFamily="34" charset="0"/>
+            </a:endParaRPr>
+          </a:p>
+          <a:p>
+            <a:pPr marL="800100" lvl="1" indent="-342900">
+              <a:buFont typeface="+mj-lt"/>
+              <a:buAutoNum type="arabicPeriod"/>
+            </a:pPr>
+            <a:r>
+              <a:rPr lang="cs-CZ" sz="1900" b="0" i="0">
+                <a:solidFill>
+                  <a:srgbClr val="FEFFFF"/>
+                </a:solidFill>
                 <a:effectLst/>
                 <a:latin typeface="Arial" panose="020B0604020202020204" pitchFamily="34" charset="0"/>
               </a:rPr>
-              <a:t> </a:t>
-            </a:r>
-            <a:r>
-              <a:rPr lang="cs-CZ" sz="2000" b="0" i="0" dirty="0" err="1">
+              <a:t>Návrh vyučovacieho prostredia na podporu študentového zmýšľania</a:t>
+            </a:r>
+            <a:endParaRPr lang="en-GB" sz="1900">
+              <a:solidFill>
+                <a:srgbClr val="FEFFFF"/>
+              </a:solidFill>
+              <a:latin typeface="Arial" panose="020B0604020202020204" pitchFamily="34" charset="0"/>
+            </a:endParaRPr>
+          </a:p>
+          <a:p>
+            <a:pPr marL="800100" lvl="1" indent="-342900">
+              <a:buFont typeface="+mj-lt"/>
+              <a:buAutoNum type="arabicPeriod"/>
+            </a:pPr>
+            <a:r>
+              <a:rPr lang="cs-CZ" sz="1900" b="0" i="0">
+                <a:solidFill>
+                  <a:srgbClr val="FEFFFF"/>
+                </a:solidFill>
                 <a:effectLst/>
                 <a:latin typeface="Arial" panose="020B0604020202020204" pitchFamily="34" charset="0"/>
               </a:rPr>
-              <a:t>prostredia</a:t>
-            </a:r>
-            <a:r>
-              <a:rPr lang="cs-CZ" sz="2000" b="0" i="0" dirty="0">
+              <a:t>Podporovanie testovania rôznych nápadov a feedbacku</a:t>
+            </a:r>
+            <a:endParaRPr lang="en-GB" sz="1900" b="0" i="0">
+              <a:solidFill>
+                <a:srgbClr val="FEFFFF"/>
+              </a:solidFill>
+              <a:effectLst/>
+              <a:latin typeface="Arial" panose="020B0604020202020204" pitchFamily="34" charset="0"/>
+            </a:endParaRPr>
+          </a:p>
+          <a:p>
+            <a:pPr marL="800100" lvl="1" indent="-342900">
+              <a:buFont typeface="+mj-lt"/>
+              <a:buAutoNum type="arabicPeriod"/>
+            </a:pPr>
+            <a:r>
+              <a:rPr lang="cs-CZ" sz="1900" b="0" i="0">
+                <a:solidFill>
+                  <a:srgbClr val="FEFFFF"/>
+                </a:solidFill>
                 <a:effectLst/>
                 <a:latin typeface="Arial" panose="020B0604020202020204" pitchFamily="34" charset="0"/>
               </a:rPr>
-              <a:t> a </a:t>
-            </a:r>
-            <a:r>
-              <a:rPr lang="cs-CZ" sz="2000" b="0" i="0" dirty="0" err="1">
+              <a:t>Poskytnutie príležitosti na zamyslenie sa nad proces</a:t>
+            </a:r>
+            <a:r>
+              <a:rPr lang="en-GB" sz="1900">
+                <a:solidFill>
+                  <a:srgbClr val="FEFFFF"/>
+                </a:solidFill>
+                <a:latin typeface="Arial" panose="020B0604020202020204" pitchFamily="34" charset="0"/>
+              </a:rPr>
+              <a:t>om</a:t>
+            </a:r>
+            <a:r>
+              <a:rPr lang="cs-CZ" sz="1900" b="0" i="0">
+                <a:solidFill>
+                  <a:srgbClr val="FEFFFF"/>
+                </a:solidFill>
                 <a:effectLst/>
                 <a:latin typeface="Arial" panose="020B0604020202020204" pitchFamily="34" charset="0"/>
               </a:rPr>
-              <a:t>zadania</a:t>
-            </a:r>
-            <a:r>
-              <a:rPr lang="cs-CZ" sz="2000" b="0" i="0" dirty="0">
-                <a:effectLst/>
-                <a:latin typeface="Arial" panose="020B0604020202020204" pitchFamily="34" charset="0"/>
-              </a:rPr>
-              <a:t> </a:t>
-            </a:r>
-            <a:r>
-              <a:rPr lang="cs-CZ" sz="2000" b="0" i="0" dirty="0" err="1">
-                <a:effectLst/>
-                <a:latin typeface="Arial" panose="020B0604020202020204" pitchFamily="34" charset="0"/>
-              </a:rPr>
-              <a:t>pre</a:t>
-            </a:r>
-            <a:r>
-              <a:rPr lang="cs-CZ" sz="2000" b="0" i="0" dirty="0">
-                <a:effectLst/>
-                <a:latin typeface="Arial" panose="020B0604020202020204" pitchFamily="34" charset="0"/>
-              </a:rPr>
-              <a:t> </a:t>
-            </a:r>
-            <a:r>
-              <a:rPr lang="cs-CZ" sz="2000" b="0" i="0" dirty="0" err="1">
-                <a:effectLst/>
-                <a:latin typeface="Arial" panose="020B0604020202020204" pitchFamily="34" charset="0"/>
-              </a:rPr>
-              <a:t>študentov</a:t>
-            </a:r>
-            <a:endParaRPr lang="en-GB" sz="2000" b="0" i="0" dirty="0">
-              <a:effectLst/>
-              <a:latin typeface="Arial" panose="020B0604020202020204" pitchFamily="34" charset="0"/>
+              <a:t> štúdia</a:t>
+            </a:r>
+            <a:endParaRPr lang="cs-CZ" sz="1900">
+              <a:solidFill>
+                <a:srgbClr val="FEFFFF"/>
+              </a:solidFill>
             </a:endParaRPr>
-          </a:p>
-          <a:p>
-            <a:pPr marL="800100" lvl="1" indent="-342900" algn="just">
-              <a:buFont typeface="+mj-lt"/>
-              <a:buAutoNum type="arabicPeriod"/>
-            </a:pPr>
-            <a:r>
-              <a:rPr lang="cs-CZ" sz="2000" b="0" i="0" dirty="0" err="1">
-                <a:effectLst/>
-                <a:latin typeface="Arial" panose="020B0604020202020204" pitchFamily="34" charset="0"/>
-              </a:rPr>
-              <a:t>Poskytnutie</a:t>
-            </a:r>
-            <a:r>
-              <a:rPr lang="cs-CZ" sz="2000" b="0" i="0" dirty="0">
-                <a:effectLst/>
-                <a:latin typeface="Arial" panose="020B0604020202020204" pitchFamily="34" charset="0"/>
-              </a:rPr>
-              <a:t> </a:t>
-            </a:r>
-            <a:r>
-              <a:rPr lang="cs-CZ" sz="2000" b="0" i="0" dirty="0" err="1">
-                <a:effectLst/>
-                <a:latin typeface="Arial" panose="020B0604020202020204" pitchFamily="34" charset="0"/>
-              </a:rPr>
-              <a:t>vlastníctva</a:t>
-            </a:r>
-            <a:r>
-              <a:rPr lang="cs-CZ" sz="2000" b="0" i="0" dirty="0">
-                <a:effectLst/>
-                <a:latin typeface="Arial" panose="020B0604020202020204" pitchFamily="34" charset="0"/>
-              </a:rPr>
-              <a:t> procesu </a:t>
-            </a:r>
-            <a:r>
-              <a:rPr lang="cs-CZ" sz="2000" b="0" i="0" dirty="0" err="1">
-                <a:effectLst/>
-                <a:latin typeface="Arial" panose="020B0604020202020204" pitchFamily="34" charset="0"/>
-              </a:rPr>
-              <a:t>študentov</a:t>
-            </a:r>
-            <a:r>
-              <a:rPr lang="cs-CZ" sz="2000" b="0" i="0" dirty="0">
-                <a:effectLst/>
-                <a:latin typeface="Arial" panose="020B0604020202020204" pitchFamily="34" charset="0"/>
-              </a:rPr>
-              <a:t> na </a:t>
-            </a:r>
-            <a:r>
-              <a:rPr lang="cs-CZ" sz="2000" b="0" i="0" dirty="0" err="1">
-                <a:effectLst/>
-                <a:latin typeface="Arial" panose="020B0604020202020204" pitchFamily="34" charset="0"/>
-              </a:rPr>
-              <a:t>vyriešenie</a:t>
-            </a:r>
-            <a:r>
-              <a:rPr lang="cs-CZ" sz="2000" b="0" i="0" dirty="0">
-                <a:effectLst/>
-                <a:latin typeface="Arial" panose="020B0604020202020204" pitchFamily="34" charset="0"/>
-              </a:rPr>
-              <a:t> problému</a:t>
-            </a:r>
-            <a:endParaRPr lang="en-GB" sz="2000" b="0" i="0" dirty="0">
-              <a:effectLst/>
-              <a:latin typeface="Arial" panose="020B0604020202020204" pitchFamily="34" charset="0"/>
-            </a:endParaRPr>
-          </a:p>
-          <a:p>
-            <a:pPr marL="800100" lvl="1" indent="-342900" algn="just">
-              <a:buFont typeface="+mj-lt"/>
-              <a:buAutoNum type="arabicPeriod"/>
-            </a:pPr>
-            <a:r>
-              <a:rPr lang="cs-CZ" sz="2000" b="0" i="0" dirty="0">
-                <a:effectLst/>
-                <a:latin typeface="Arial" panose="020B0604020202020204" pitchFamily="34" charset="0"/>
-              </a:rPr>
-              <a:t>Návrh </a:t>
-            </a:r>
-            <a:r>
-              <a:rPr lang="cs-CZ" sz="2000" b="0" i="0" dirty="0" err="1">
-                <a:effectLst/>
-                <a:latin typeface="Arial" panose="020B0604020202020204" pitchFamily="34" charset="0"/>
-              </a:rPr>
-              <a:t>vyučovacieho</a:t>
-            </a:r>
-            <a:r>
-              <a:rPr lang="cs-CZ" sz="2000" b="0" i="0" dirty="0">
-                <a:effectLst/>
-                <a:latin typeface="Arial" panose="020B0604020202020204" pitchFamily="34" charset="0"/>
-              </a:rPr>
-              <a:t> </a:t>
-            </a:r>
-            <a:r>
-              <a:rPr lang="cs-CZ" sz="2000" b="0" i="0" dirty="0" err="1">
-                <a:effectLst/>
-                <a:latin typeface="Arial" panose="020B0604020202020204" pitchFamily="34" charset="0"/>
-              </a:rPr>
-              <a:t>prostredia</a:t>
-            </a:r>
-            <a:r>
-              <a:rPr lang="cs-CZ" sz="2000" b="0" i="0" dirty="0">
-                <a:effectLst/>
-                <a:latin typeface="Arial" panose="020B0604020202020204" pitchFamily="34" charset="0"/>
-              </a:rPr>
-              <a:t> na podporu </a:t>
-            </a:r>
-            <a:r>
-              <a:rPr lang="cs-CZ" sz="2000" b="0" i="0" dirty="0" err="1">
-                <a:effectLst/>
-                <a:latin typeface="Arial" panose="020B0604020202020204" pitchFamily="34" charset="0"/>
-              </a:rPr>
-              <a:t>študentového</a:t>
-            </a:r>
-            <a:r>
-              <a:rPr lang="cs-CZ" sz="2000" b="0" i="0" dirty="0">
-                <a:effectLst/>
-                <a:latin typeface="Arial" panose="020B0604020202020204" pitchFamily="34" charset="0"/>
-              </a:rPr>
-              <a:t> </a:t>
-            </a:r>
-            <a:r>
-              <a:rPr lang="cs-CZ" sz="2000" b="0" i="0" dirty="0" err="1">
-                <a:effectLst/>
-                <a:latin typeface="Arial" panose="020B0604020202020204" pitchFamily="34" charset="0"/>
-              </a:rPr>
-              <a:t>zmýšľania</a:t>
-            </a:r>
-            <a:endParaRPr lang="en-GB" sz="2000" dirty="0">
-              <a:latin typeface="Arial" panose="020B0604020202020204" pitchFamily="34" charset="0"/>
-            </a:endParaRPr>
-          </a:p>
-          <a:p>
-            <a:pPr marL="800100" lvl="1" indent="-342900" algn="just">
-              <a:buFont typeface="+mj-lt"/>
-              <a:buAutoNum type="arabicPeriod"/>
-            </a:pPr>
-            <a:r>
-              <a:rPr lang="cs-CZ" sz="2000" b="0" i="0" dirty="0" err="1">
-                <a:effectLst/>
-                <a:latin typeface="Arial" panose="020B0604020202020204" pitchFamily="34" charset="0"/>
-              </a:rPr>
-              <a:t>Podporovanie</a:t>
-            </a:r>
-            <a:r>
-              <a:rPr lang="cs-CZ" sz="2000" b="0" i="0" dirty="0">
-                <a:effectLst/>
-                <a:latin typeface="Arial" panose="020B0604020202020204" pitchFamily="34" charset="0"/>
-              </a:rPr>
-              <a:t> </a:t>
-            </a:r>
-            <a:r>
-              <a:rPr lang="cs-CZ" sz="2000" b="0" i="0" dirty="0" err="1">
-                <a:effectLst/>
-                <a:latin typeface="Arial" panose="020B0604020202020204" pitchFamily="34" charset="0"/>
-              </a:rPr>
-              <a:t>testovania</a:t>
-            </a:r>
-            <a:r>
-              <a:rPr lang="cs-CZ" sz="2000" b="0" i="0" dirty="0">
-                <a:effectLst/>
-                <a:latin typeface="Arial" panose="020B0604020202020204" pitchFamily="34" charset="0"/>
-              </a:rPr>
-              <a:t> </a:t>
-            </a:r>
-            <a:r>
-              <a:rPr lang="cs-CZ" sz="2000" b="0" i="0" dirty="0" err="1">
-                <a:effectLst/>
-                <a:latin typeface="Arial" panose="020B0604020202020204" pitchFamily="34" charset="0"/>
-              </a:rPr>
-              <a:t>rôznych</a:t>
-            </a:r>
-            <a:r>
-              <a:rPr lang="cs-CZ" sz="2000" b="0" i="0" dirty="0">
-                <a:effectLst/>
-                <a:latin typeface="Arial" panose="020B0604020202020204" pitchFamily="34" charset="0"/>
-              </a:rPr>
-              <a:t> </a:t>
-            </a:r>
-            <a:r>
-              <a:rPr lang="cs-CZ" sz="2000" b="0" i="0" dirty="0" err="1">
-                <a:effectLst/>
-                <a:latin typeface="Arial" panose="020B0604020202020204" pitchFamily="34" charset="0"/>
-              </a:rPr>
-              <a:t>nápadov</a:t>
-            </a:r>
-            <a:r>
-              <a:rPr lang="cs-CZ" sz="2000" b="0" i="0" dirty="0">
-                <a:effectLst/>
-                <a:latin typeface="Arial" panose="020B0604020202020204" pitchFamily="34" charset="0"/>
-              </a:rPr>
-              <a:t> a feedbacku</a:t>
-            </a:r>
-            <a:endParaRPr lang="en-GB" sz="2000" b="0" i="0" dirty="0">
-              <a:effectLst/>
-              <a:latin typeface="Arial" panose="020B0604020202020204" pitchFamily="34" charset="0"/>
-            </a:endParaRPr>
-          </a:p>
-          <a:p>
-            <a:pPr marL="800100" lvl="1" indent="-342900" algn="just">
-              <a:buFont typeface="+mj-lt"/>
-              <a:buAutoNum type="arabicPeriod"/>
-            </a:pPr>
-            <a:r>
-              <a:rPr lang="cs-CZ" sz="2000" b="0" i="0" dirty="0" err="1">
-                <a:effectLst/>
-                <a:latin typeface="Arial" panose="020B0604020202020204" pitchFamily="34" charset="0"/>
-              </a:rPr>
-              <a:t>Poskytnutie</a:t>
-            </a:r>
-            <a:r>
-              <a:rPr lang="cs-CZ" sz="2000" b="0" i="0" dirty="0">
-                <a:effectLst/>
-                <a:latin typeface="Arial" panose="020B0604020202020204" pitchFamily="34" charset="0"/>
-              </a:rPr>
-              <a:t> </a:t>
-            </a:r>
-            <a:r>
-              <a:rPr lang="cs-CZ" sz="2000" b="0" i="0" dirty="0" err="1">
-                <a:effectLst/>
-                <a:latin typeface="Arial" panose="020B0604020202020204" pitchFamily="34" charset="0"/>
-              </a:rPr>
-              <a:t>príležitosti</a:t>
-            </a:r>
-            <a:r>
-              <a:rPr lang="cs-CZ" sz="2000" b="0" i="0" dirty="0">
-                <a:effectLst/>
-                <a:latin typeface="Arial" panose="020B0604020202020204" pitchFamily="34" charset="0"/>
-              </a:rPr>
-              <a:t> na </a:t>
-            </a:r>
-            <a:r>
-              <a:rPr lang="cs-CZ" sz="2000" b="0" i="0" dirty="0" err="1">
-                <a:effectLst/>
-                <a:latin typeface="Arial" panose="020B0604020202020204" pitchFamily="34" charset="0"/>
-              </a:rPr>
-              <a:t>zamyslenie</a:t>
-            </a:r>
-            <a:r>
-              <a:rPr lang="cs-CZ" sz="2000" b="0" i="0" dirty="0">
-                <a:effectLst/>
-                <a:latin typeface="Arial" panose="020B0604020202020204" pitchFamily="34" charset="0"/>
-              </a:rPr>
-              <a:t> </a:t>
-            </a:r>
-            <a:r>
-              <a:rPr lang="cs-CZ" sz="2000" b="0" i="0" dirty="0" err="1">
-                <a:effectLst/>
-                <a:latin typeface="Arial" panose="020B0604020202020204" pitchFamily="34" charset="0"/>
-              </a:rPr>
-              <a:t>sa</a:t>
-            </a:r>
-            <a:r>
-              <a:rPr lang="cs-CZ" sz="2000" b="0" i="0" dirty="0">
-                <a:effectLst/>
-                <a:latin typeface="Arial" panose="020B0604020202020204" pitchFamily="34" charset="0"/>
-              </a:rPr>
-              <a:t> nad proces</a:t>
-            </a:r>
-            <a:r>
-              <a:rPr lang="en-GB" sz="2000" dirty="0">
-                <a:latin typeface="Arial" panose="020B0604020202020204" pitchFamily="34" charset="0"/>
-              </a:rPr>
-              <a:t>om</a:t>
-            </a:r>
-            <a:r>
-              <a:rPr lang="cs-CZ" sz="2000" b="0" i="0" dirty="0">
-                <a:effectLst/>
-                <a:latin typeface="Arial" panose="020B0604020202020204" pitchFamily="34" charset="0"/>
-              </a:rPr>
-              <a:t> </a:t>
-            </a:r>
-            <a:r>
-              <a:rPr lang="cs-CZ" sz="2000" b="0" i="0" dirty="0" err="1">
-                <a:effectLst/>
-                <a:latin typeface="Arial" panose="020B0604020202020204" pitchFamily="34" charset="0"/>
-              </a:rPr>
-              <a:t>štúdia</a:t>
-            </a:r>
-            <a:endParaRPr lang="cs-CZ" sz="2800" dirty="0"/>
           </a:p>
         </p:txBody>
       </p:sp>
@@ -10235,7 +8800,7 @@
         </p:nvSpPr>
         <p:spPr>
           <a:xfrm>
-            <a:off x="2899220" y="1734553"/>
+            <a:off x="2857674" y="1979047"/>
             <a:ext cx="6227064" cy="1234440"/>
           </a:xfrm>
         </p:spPr>
@@ -10381,7 +8946,7 @@
         </p:nvSpPr>
         <p:spPr>
           <a:xfrm>
-            <a:off x="2874012" y="3960684"/>
+            <a:off x="2874012" y="4203571"/>
             <a:ext cx="8660763" cy="2367221"/>
           </a:xfrm>
         </p:spPr>
@@ -10401,7 +8966,15 @@
             </a:r>
             <a:r>
               <a:rPr lang="en-GB" dirty="0"/>
-              <a:t> feedback </a:t>
+              <a:t> feedback</a:t>
+            </a:r>
+            <a:r>
+              <a:rPr lang="sk-SK" dirty="0"/>
+              <a:t>u</a:t>
+            </a:r>
+            <a:r>
+              <a:rPr lang="en-GB" dirty="0"/>
+              <a:t> </a:t>
             </a:r>
             <a:r>
               <a:rPr lang="en-GB" dirty="0" err="1"/>
@@ -10417,11 +8990,15 @@
             </a:r>
             <a:r>
               <a:rPr lang="en-GB" dirty="0"/>
-              <a:t> </a:t>
+              <a:t> pr</a:t>
+            </a:r>
+            <a:r>
+              <a:rPr lang="sk-SK" dirty="0"/>
+              <a:t>o</a:t>
             </a:r>
             <a:r>
               <a:rPr lang="en-GB" dirty="0" err="1"/>
-              <a:t>prestredí</a:t>
+              <a:t>stredí</a:t>
             </a:r>
             <a:r>
               <a:rPr lang="en-GB" dirty="0"/>

</xml_diff>